<commit_message>
update ppt for 10/31
</commit_message>
<xml_diff>
--- a/Image Segmentation of Concrete Roads.pptx
+++ b/Image Segmentation of Concrete Roads.pptx
@@ -11,9 +11,11 @@
     <p:sldId id="261" r:id="rId5"/>
     <p:sldId id="262" r:id="rId6"/>
     <p:sldId id="263" r:id="rId7"/>
-    <p:sldId id="264" r:id="rId8"/>
-    <p:sldId id="266" r:id="rId9"/>
-    <p:sldId id="265" r:id="rId10"/>
+    <p:sldId id="270" r:id="rId8"/>
+    <p:sldId id="264" r:id="rId9"/>
+    <p:sldId id="266" r:id="rId10"/>
+    <p:sldId id="267" r:id="rId11"/>
+    <p:sldId id="268" r:id="rId12"/>
   </p:sldIdLst>
   <p:sldSz cx="12192000" cy="6858000"/>
   <p:notesSz cx="6858000" cy="9144000"/>
@@ -118,6 +120,118 @@
     </p:ext>
   </p:extLst>
 </p:presentation>
+</file>
+
+<file path=ppt/ink/ink1.xml><?xml version="1.0" encoding="utf-8"?>
+<inkml:ink xmlns:inkml="http://www.w3.org/2003/InkML">
+  <inkml:definitions>
+    <inkml:context xml:id="ctx0">
+      <inkml:inkSource xml:id="inkSrc0">
+        <inkml:traceFormat>
+          <inkml:channel name="X" type="integer" min="-2.14748E9" max="2.14748E9" units="cm"/>
+          <inkml:channel name="Y" type="integer" min="-2.14748E9" max="2.14748E9" units="cm"/>
+          <inkml:channel name="F" type="integer" max="32767" units="dev"/>
+        </inkml:traceFormat>
+        <inkml:channelProperties>
+          <inkml:channelProperty channel="X" name="resolution" value="1000" units="1/cm"/>
+          <inkml:channelProperty channel="Y" name="resolution" value="1000" units="1/cm"/>
+          <inkml:channelProperty channel="F" name="resolution" value="0" units="1/dev"/>
+        </inkml:channelProperties>
+      </inkml:inkSource>
+      <inkml:timestamp xml:id="ts0" timeString="2024-10-29T14:32:42.356"/>
+    </inkml:context>
+    <inkml:brush xml:id="br0">
+      <inkml:brushProperty name="width" value="0.1" units="cm"/>
+      <inkml:brushProperty name="height" value="0.1" units="cm"/>
+      <inkml:brushProperty name="color" value="#CC0066"/>
+    </inkml:brush>
+  </inkml:definitions>
+  <inkml:trace contextRef="#ctx0" brushRef="#br0">1 1 24575,'25'0'0,"17"0"0,40 4 0,31 10 0,59 15 0,57 11 0,43 12 0,57 22 0,14 8-3276,-26-7 3267,-45-12 9,-57-16-727,-55-17 727,-52-12 0,-44-15 0,-33-7-4179</inkml:trace>
+</inkml:ink>
+</file>
+
+<file path=ppt/ink/ink2.xml><?xml version="1.0" encoding="utf-8"?>
+<inkml:ink xmlns:inkml="http://www.w3.org/2003/InkML">
+  <inkml:definitions>
+    <inkml:context xml:id="ctx0">
+      <inkml:inkSource xml:id="inkSrc0">
+        <inkml:traceFormat>
+          <inkml:channel name="X" type="integer" min="-2.14748E9" max="2.14748E9" units="cm"/>
+          <inkml:channel name="Y" type="integer" min="-2.14748E9" max="2.14748E9" units="cm"/>
+          <inkml:channel name="F" type="integer" max="32767" units="dev"/>
+        </inkml:traceFormat>
+        <inkml:channelProperties>
+          <inkml:channelProperty channel="X" name="resolution" value="1000" units="1/cm"/>
+          <inkml:channelProperty channel="Y" name="resolution" value="1000" units="1/cm"/>
+          <inkml:channelProperty channel="F" name="resolution" value="0" units="1/dev"/>
+        </inkml:channelProperties>
+      </inkml:inkSource>
+      <inkml:timestamp xml:id="ts0" timeString="2024-10-29T14:32:42.969"/>
+    </inkml:context>
+    <inkml:brush xml:id="br0">
+      <inkml:brushProperty name="width" value="0.1" units="cm"/>
+      <inkml:brushProperty name="height" value="0.1" units="cm"/>
+      <inkml:brushProperty name="color" value="#CC0066"/>
+    </inkml:brush>
+  </inkml:definitions>
+  <inkml:trace contextRef="#ctx0" brushRef="#br0">84 0 24575,'6'1'0,"0"0"0,-1 0 0,1 0 0,-1 1 0,1 0 0,-1 0 0,1 0 0,7 5 0,1 0 0,33 17 0,-3 2 0,0 2 0,48 40 0,115 113 0,-156-134 0,-48-44 0,1 0 0,-1 0 0,0 0 0,1 0 0,-1 1 0,4 7 0,-6-11 0,-1 1 0,0-1 0,0 1 0,0-1 0,1 1 0,-1-1 0,0 1 0,0-1 0,0 1 0,0-1 0,0 1 0,0-1 0,0 1 0,0-1 0,0 1 0,0-1 0,0 1 0,0 0 0,-1-1 0,1 1 0,0-1 0,-1 1 0,1 0 0,-1 0 0,0 0 0,0-1 0,0 1 0,0 0 0,0-1 0,0 1 0,0 0 0,0-1 0,0 1 0,0-1 0,0 0 0,0 1 0,0-1 0,-2 0 0,-104 19 69,53-11-1742,-54 15 1,87-17 711,-34 11-435,-75 31 0,116-42 1468,0 1 0,1 0 0,0 0 0,0 2 0,1 0 0,0 0 0,1 1 0,0 0 0,0 1-1,-15 20 1,23-25 519,-1 0 0,1 0-1,0 1 1,1-1-1,-1 1 1,-2 12 0,2 5-6679</inkml:trace>
+</inkml:ink>
+</file>
+
+<file path=ppt/ink/ink3.xml><?xml version="1.0" encoding="utf-8"?>
+<inkml:ink xmlns:inkml="http://www.w3.org/2003/InkML">
+  <inkml:definitions>
+    <inkml:context xml:id="ctx0">
+      <inkml:inkSource xml:id="inkSrc0">
+        <inkml:traceFormat>
+          <inkml:channel name="X" type="integer" min="-2.14748E9" max="2.14748E9" units="cm"/>
+          <inkml:channel name="Y" type="integer" min="-2.14748E9" max="2.14748E9" units="cm"/>
+          <inkml:channel name="F" type="integer" max="32767" units="dev"/>
+        </inkml:traceFormat>
+        <inkml:channelProperties>
+          <inkml:channelProperty channel="X" name="resolution" value="1000" units="1/cm"/>
+          <inkml:channelProperty channel="Y" name="resolution" value="1000" units="1/cm"/>
+          <inkml:channelProperty channel="F" name="resolution" value="0" units="1/dev"/>
+        </inkml:channelProperties>
+      </inkml:inkSource>
+      <inkml:timestamp xml:id="ts0" timeString="2024-10-29T14:35:09.018"/>
+    </inkml:context>
+    <inkml:brush xml:id="br0">
+      <inkml:brushProperty name="width" value="0.1" units="cm"/>
+      <inkml:brushProperty name="height" value="0.1" units="cm"/>
+      <inkml:brushProperty name="color" value="#CC0066"/>
+    </inkml:brush>
+  </inkml:definitions>
+  <inkml:trace contextRef="#ctx0" brushRef="#br0">2 1 24575,'60'0'0,"41"0"0,93 4 0,75 10 0,142 15 0,133 11 0,105 12 0,133 22 0,35 8-3276,-61-7 3267,-109-12 9,-134-16-727,-134-17 727,-121-12 0,-105-15 0,-78-7-4179</inkml:trace>
+</inkml:ink>
+</file>
+
+<file path=ppt/ink/ink4.xml><?xml version="1.0" encoding="utf-8"?>
+<inkml:ink xmlns:inkml="http://www.w3.org/2003/InkML">
+  <inkml:definitions>
+    <inkml:context xml:id="ctx0">
+      <inkml:inkSource xml:id="inkSrc0">
+        <inkml:traceFormat>
+          <inkml:channel name="X" type="integer" min="-2.14748E9" max="2.14748E9" units="cm"/>
+          <inkml:channel name="Y" type="integer" min="-2.14748E9" max="2.14748E9" units="cm"/>
+          <inkml:channel name="F" type="integer" max="32767" units="dev"/>
+        </inkml:traceFormat>
+        <inkml:channelProperties>
+          <inkml:channelProperty channel="X" name="resolution" value="1000" units="1/cm"/>
+          <inkml:channelProperty channel="Y" name="resolution" value="1000" units="1/cm"/>
+          <inkml:channelProperty channel="F" name="resolution" value="0" units="1/dev"/>
+        </inkml:channelProperties>
+      </inkml:inkSource>
+      <inkml:timestamp xml:id="ts0" timeString="2024-10-29T14:35:09.019"/>
+    </inkml:context>
+    <inkml:brush xml:id="br0">
+      <inkml:brushProperty name="width" value="0.1" units="cm"/>
+      <inkml:brushProperty name="height" value="0.1" units="cm"/>
+      <inkml:brushProperty name="color" value="#CC0066"/>
+    </inkml:brush>
+  </inkml:definitions>
+  <inkml:trace contextRef="#ctx0" brushRef="#br0">200 0 24575,'14'1'0,"0"0"0,-1 0 0,1 0 0,-1 1 0,0 0 0,0 0 0,-1 0 0,21 5 0,1 0 0,75 17 0,-2 2 0,-2 2 0,113 40 0,275 113 0,-372-134 0,-113-44 0,0 0 0,1 0 0,-1 0 0,-1 0 0,0 1 0,11 7 0,-17-11 0,0 1 0,-1-1 0,1 1 0,-1-1 0,1 1 0,-1-1 0,0 1 0,0-1 0,1 1 0,-1-1 0,0 1 0,0-1 0,0 1 0,0-1 0,0 1 0,-1-1 0,1 1 0,0 0 0,-1-1 0,1 1 0,-1-1 0,0 1 0,-1 0 0,0 0 0,0 0 0,0-1 0,0 1 0,0 0 0,-1-1 0,1 1 0,-1 0 0,1-1 0,-1 1 0,1-1 0,-1 0 0,0 1 0,1-1 0,-4 0 0,-250 19 69,128-11-1742,-130 15 1,210-17 711,-85 11-435,-176 31 0,276-42 1468,1 1 0,0 0 0,1 0 0,1 2 0,0 0 0,2 0 0,1 1 0,0 0 0,2 1-1,-36 20 1,52-25 519,1 0 0,1 0-1,0 1 1,1-1-1,0 1 1,-6 12 0,4 5-6679</inkml:trace>
+</inkml:ink>
 </file>
 
 <file path=ppt/slideLayouts/slideLayout1.xml><?xml version="1.0" encoding="utf-8"?>
@@ -3430,6 +3544,439 @@
 </p:sld>
 </file>
 
+<file path=ppt/slides/slide10.xml><?xml version="1.0" encoding="utf-8"?>
+<p:sld xmlns:a="http://schemas.openxmlformats.org/drawingml/2006/main" xmlns:r="http://schemas.openxmlformats.org/officeDocument/2006/relationships" xmlns:p="http://schemas.openxmlformats.org/presentationml/2006/main">
+  <p:cSld>
+    <p:spTree>
+      <p:nvGrpSpPr>
+        <p:cNvPr id="1" name=""/>
+        <p:cNvGrpSpPr/>
+        <p:nvPr/>
+      </p:nvGrpSpPr>
+      <p:grpSpPr>
+        <a:xfrm>
+          <a:off x="0" y="0"/>
+          <a:ext cx="0" cy="0"/>
+          <a:chOff x="0" y="0"/>
+          <a:chExt cx="0" cy="0"/>
+        </a:xfrm>
+      </p:grpSpPr>
+      <p:sp>
+        <p:nvSpPr>
+          <p:cNvPr id="2" name="Title 1">
+            <a:extLst>
+              <a:ext uri="{FF2B5EF4-FFF2-40B4-BE49-F238E27FC236}">
+                <a16:creationId xmlns:a16="http://schemas.microsoft.com/office/drawing/2014/main" id="{E5D2891B-F272-4498-BEBE-DE4BC2C6506E}"/>
+              </a:ext>
+            </a:extLst>
+          </p:cNvPr>
+          <p:cNvSpPr>
+            <a:spLocks noGrp="1"/>
+          </p:cNvSpPr>
+          <p:nvPr>
+            <p:ph type="title"/>
+          </p:nvPr>
+        </p:nvSpPr>
+        <p:spPr>
+          <a:xfrm>
+            <a:off x="838200" y="18255"/>
+            <a:ext cx="10515600" cy="1325563"/>
+          </a:xfrm>
+        </p:spPr>
+        <p:txBody>
+          <a:bodyPr/>
+          <a:lstStyle/>
+          <a:p>
+            <a:r>
+              <a:rPr lang="en-US" altLang="zh-TW" dirty="0"/>
+              <a:t>API structure</a:t>
+            </a:r>
+            <a:endParaRPr lang="zh-TW" altLang="en-US" dirty="0"/>
+          </a:p>
+        </p:txBody>
+      </p:sp>
+      <p:sp>
+        <p:nvSpPr>
+          <p:cNvPr id="5" name="Content Placeholder 4">
+            <a:extLst>
+              <a:ext uri="{FF2B5EF4-FFF2-40B4-BE49-F238E27FC236}">
+                <a16:creationId xmlns:a16="http://schemas.microsoft.com/office/drawing/2014/main" id="{8EAB92C2-B7FD-4C97-80EC-B8EBC7A487F3}"/>
+              </a:ext>
+            </a:extLst>
+          </p:cNvPr>
+          <p:cNvSpPr>
+            <a:spLocks noGrp="1"/>
+          </p:cNvSpPr>
+          <p:nvPr>
+            <p:ph idx="1"/>
+          </p:nvPr>
+        </p:nvSpPr>
+        <p:spPr>
+          <a:xfrm>
+            <a:off x="838200" y="1066782"/>
+            <a:ext cx="10515600" cy="1766066"/>
+          </a:xfrm>
+        </p:spPr>
+        <p:txBody>
+          <a:bodyPr>
+            <a:normAutofit/>
+          </a:bodyPr>
+          <a:lstStyle/>
+          <a:p>
+            <a:r>
+              <a:rPr lang="en-US" altLang="zh-TW" dirty="0" err="1"/>
+              <a:t>count_dist</a:t>
+            </a:r>
+            <a:endParaRPr lang="en-US" altLang="zh-TW" dirty="0"/>
+          </a:p>
+          <a:p>
+            <a:pPr lvl="1"/>
+            <a:r>
+              <a:rPr lang="en-US" altLang="zh-TW" dirty="0"/>
+              <a:t>Input: (u8) LBP_Mode_n0[N,2], (u8) LBP_Mode_n1[N,2]</a:t>
+            </a:r>
+          </a:p>
+          <a:p>
+            <a:pPr lvl="1"/>
+            <a:r>
+              <a:rPr lang="en-US" altLang="zh-TW" dirty="0"/>
+              <a:t>Output: (u16) </a:t>
+            </a:r>
+            <a:r>
+              <a:rPr lang="en-US" altLang="zh-TW" dirty="0" err="1"/>
+              <a:t>dist</a:t>
+            </a:r>
+            <a:endParaRPr lang="en-US" altLang="zh-TW" dirty="0"/>
+          </a:p>
+          <a:p>
+            <a:pPr lvl="1"/>
+            <a:r>
+              <a:rPr lang="en-US" altLang="zh-TW" dirty="0"/>
+              <a:t>Parameters: None</a:t>
+            </a:r>
+          </a:p>
+        </p:txBody>
+      </p:sp>
+      <p:sp>
+        <p:nvSpPr>
+          <p:cNvPr id="6" name="TextBox 5">
+            <a:extLst>
+              <a:ext uri="{FF2B5EF4-FFF2-40B4-BE49-F238E27FC236}">
+                <a16:creationId xmlns:a16="http://schemas.microsoft.com/office/drawing/2014/main" id="{29F0A3BD-184B-45C7-8DB5-98E6D350FD77}"/>
+              </a:ext>
+            </a:extLst>
+          </p:cNvPr>
+          <p:cNvSpPr txBox="1"/>
+          <p:nvPr/>
+        </p:nvSpPr>
+        <p:spPr>
+          <a:xfrm>
+            <a:off x="1264024" y="2718290"/>
+            <a:ext cx="7727576" cy="646331"/>
+          </a:xfrm>
+          <a:prstGeom prst="rect">
+            <a:avLst/>
+          </a:prstGeom>
+          <a:noFill/>
+        </p:spPr>
+        <p:txBody>
+          <a:bodyPr wrap="square">
+            <a:spAutoFit/>
+          </a:bodyPr>
+          <a:lstStyle/>
+          <a:p>
+            <a:r>
+              <a:rPr lang="en-US" altLang="zh-TW" dirty="0"/>
+              <a:t>Pseudocode:</a:t>
+            </a:r>
+          </a:p>
+          <a:p>
+            <a:endParaRPr lang="en-US" altLang="zh-TW" dirty="0"/>
+          </a:p>
+        </p:txBody>
+      </p:sp>
+      <p:pic>
+        <p:nvPicPr>
+          <p:cNvPr id="10" name="Picture 9">
+            <a:extLst>
+              <a:ext uri="{FF2B5EF4-FFF2-40B4-BE49-F238E27FC236}">
+                <a16:creationId xmlns:a16="http://schemas.microsoft.com/office/drawing/2014/main" id="{69DAA39D-7EE9-4AC4-8D4E-4ACF7DC14EAE}"/>
+              </a:ext>
+            </a:extLst>
+          </p:cNvPr>
+          <p:cNvPicPr>
+            <a:picLocks noChangeAspect="1"/>
+          </p:cNvPicPr>
+          <p:nvPr/>
+        </p:nvPicPr>
+        <p:blipFill>
+          <a:blip r:embed="rId2"/>
+          <a:stretch>
+            <a:fillRect/>
+          </a:stretch>
+        </p:blipFill>
+        <p:spPr>
+          <a:xfrm>
+            <a:off x="1264024" y="3041454"/>
+            <a:ext cx="8158534" cy="2247721"/>
+          </a:xfrm>
+          <a:prstGeom prst="rect">
+            <a:avLst/>
+          </a:prstGeom>
+        </p:spPr>
+      </p:pic>
+    </p:spTree>
+    <p:extLst>
+      <p:ext uri="{BB962C8B-B14F-4D97-AF65-F5344CB8AC3E}">
+        <p14:creationId xmlns:p14="http://schemas.microsoft.com/office/powerpoint/2010/main" val="1017137951"/>
+      </p:ext>
+    </p:extLst>
+  </p:cSld>
+  <p:clrMapOvr>
+    <a:masterClrMapping/>
+  </p:clrMapOvr>
+</p:sld>
+</file>
+
+<file path=ppt/slides/slide11.xml><?xml version="1.0" encoding="utf-8"?>
+<p:sld xmlns:a="http://schemas.openxmlformats.org/drawingml/2006/main" xmlns:r="http://schemas.openxmlformats.org/officeDocument/2006/relationships" xmlns:p="http://schemas.openxmlformats.org/presentationml/2006/main">
+  <p:cSld>
+    <p:spTree>
+      <p:nvGrpSpPr>
+        <p:cNvPr id="1" name=""/>
+        <p:cNvGrpSpPr/>
+        <p:nvPr/>
+      </p:nvGrpSpPr>
+      <p:grpSpPr>
+        <a:xfrm>
+          <a:off x="0" y="0"/>
+          <a:ext cx="0" cy="0"/>
+          <a:chOff x="0" y="0"/>
+          <a:chExt cx="0" cy="0"/>
+        </a:xfrm>
+      </p:grpSpPr>
+      <p:sp>
+        <p:nvSpPr>
+          <p:cNvPr id="2" name="Title 1">
+            <a:extLst>
+              <a:ext uri="{FF2B5EF4-FFF2-40B4-BE49-F238E27FC236}">
+                <a16:creationId xmlns:a16="http://schemas.microsoft.com/office/drawing/2014/main" id="{E5D2891B-F272-4498-BEBE-DE4BC2C6506E}"/>
+              </a:ext>
+            </a:extLst>
+          </p:cNvPr>
+          <p:cNvSpPr>
+            <a:spLocks noGrp="1"/>
+          </p:cNvSpPr>
+          <p:nvPr>
+            <p:ph type="title"/>
+          </p:nvPr>
+        </p:nvSpPr>
+        <p:spPr>
+          <a:xfrm>
+            <a:off x="838200" y="18255"/>
+            <a:ext cx="10515600" cy="1325563"/>
+          </a:xfrm>
+        </p:spPr>
+        <p:txBody>
+          <a:bodyPr/>
+          <a:lstStyle/>
+          <a:p>
+            <a:r>
+              <a:rPr lang="en-US" altLang="zh-TW" dirty="0"/>
+              <a:t>API structure</a:t>
+            </a:r>
+            <a:endParaRPr lang="zh-TW" altLang="en-US" dirty="0"/>
+          </a:p>
+        </p:txBody>
+      </p:sp>
+      <p:sp>
+        <p:nvSpPr>
+          <p:cNvPr id="5" name="Content Placeholder 4">
+            <a:extLst>
+              <a:ext uri="{FF2B5EF4-FFF2-40B4-BE49-F238E27FC236}">
+                <a16:creationId xmlns:a16="http://schemas.microsoft.com/office/drawing/2014/main" id="{8EAB92C2-B7FD-4C97-80EC-B8EBC7A487F3}"/>
+              </a:ext>
+            </a:extLst>
+          </p:cNvPr>
+          <p:cNvSpPr>
+            <a:spLocks noGrp="1"/>
+          </p:cNvSpPr>
+          <p:nvPr>
+            <p:ph idx="1"/>
+          </p:nvPr>
+        </p:nvSpPr>
+        <p:spPr>
+          <a:xfrm>
+            <a:off x="376518" y="1066782"/>
+            <a:ext cx="11438964" cy="1766066"/>
+          </a:xfrm>
+        </p:spPr>
+        <p:txBody>
+          <a:bodyPr>
+            <a:normAutofit/>
+          </a:bodyPr>
+          <a:lstStyle/>
+          <a:p>
+            <a:r>
+              <a:rPr lang="en-US" altLang="zh-TW" dirty="0" err="1"/>
+              <a:t>dist_compare</a:t>
+            </a:r>
+            <a:endParaRPr lang="en-US" altLang="zh-TW" dirty="0"/>
+          </a:p>
+          <a:p>
+            <a:pPr lvl="1"/>
+            <a:r>
+              <a:rPr lang="en-US" altLang="zh-TW" dirty="0"/>
+              <a:t>Input: (u16) </a:t>
+            </a:r>
+            <a:r>
+              <a:rPr lang="en-US" altLang="zh-TW" dirty="0" err="1"/>
+              <a:t>dist</a:t>
+            </a:r>
+            <a:r>
+              <a:rPr lang="en-US" altLang="zh-TW" dirty="0"/>
+              <a:t>, (u8) Mask[L,W], (u16) </a:t>
+            </a:r>
+            <a:r>
+              <a:rPr lang="en-US" altLang="zh-TW" dirty="0" err="1"/>
+              <a:t>isRoad</a:t>
+            </a:r>
+            <a:endParaRPr lang="en-US" altLang="zh-TW" dirty="0"/>
+          </a:p>
+          <a:p>
+            <a:pPr lvl="1"/>
+            <a:r>
+              <a:rPr lang="en-US" altLang="zh-TW" dirty="0"/>
+              <a:t>Output: (u16) </a:t>
+            </a:r>
+            <a:r>
+              <a:rPr lang="en-US" altLang="zh-TW" dirty="0" err="1"/>
+              <a:t>isRoad</a:t>
+            </a:r>
+            <a:endParaRPr lang="en-US" altLang="zh-TW" dirty="0"/>
+          </a:p>
+          <a:p>
+            <a:pPr lvl="1"/>
+            <a:r>
+              <a:rPr lang="en-US" altLang="zh-TW" dirty="0"/>
+              <a:t>Parameters: (u8) </a:t>
+            </a:r>
+            <a:r>
+              <a:rPr lang="en-US" altLang="zh-TW" dirty="0" err="1"/>
+              <a:t>start_x</a:t>
+            </a:r>
+            <a:r>
+              <a:rPr lang="en-US" altLang="zh-TW" dirty="0"/>
+              <a:t>, (u8) </a:t>
+            </a:r>
+            <a:r>
+              <a:rPr lang="en-US" altLang="zh-TW" dirty="0" err="1"/>
+              <a:t>start_y</a:t>
+            </a:r>
+            <a:r>
+              <a:rPr lang="en-US" altLang="zh-TW" dirty="0"/>
+              <a:t>, (u8) </a:t>
+            </a:r>
+            <a:r>
+              <a:rPr lang="en-US" altLang="zh-TW" dirty="0" err="1"/>
+              <a:t>end_x</a:t>
+            </a:r>
+            <a:r>
+              <a:rPr lang="en-US" altLang="zh-TW" dirty="0"/>
+              <a:t>, (u8) </a:t>
+            </a:r>
+            <a:r>
+              <a:rPr lang="en-US" altLang="zh-TW" dirty="0" err="1"/>
+              <a:t>end_y</a:t>
+            </a:r>
+            <a:r>
+              <a:rPr lang="en-US" altLang="zh-TW" dirty="0"/>
+              <a:t>, (u16) Threshold</a:t>
+            </a:r>
+          </a:p>
+        </p:txBody>
+      </p:sp>
+      <p:sp>
+        <p:nvSpPr>
+          <p:cNvPr id="6" name="TextBox 5">
+            <a:extLst>
+              <a:ext uri="{FF2B5EF4-FFF2-40B4-BE49-F238E27FC236}">
+                <a16:creationId xmlns:a16="http://schemas.microsoft.com/office/drawing/2014/main" id="{29F0A3BD-184B-45C7-8DB5-98E6D350FD77}"/>
+              </a:ext>
+            </a:extLst>
+          </p:cNvPr>
+          <p:cNvSpPr txBox="1"/>
+          <p:nvPr/>
+        </p:nvSpPr>
+        <p:spPr>
+          <a:xfrm>
+            <a:off x="1264024" y="2718290"/>
+            <a:ext cx="7727576" cy="646331"/>
+          </a:xfrm>
+          <a:prstGeom prst="rect">
+            <a:avLst/>
+          </a:prstGeom>
+          <a:noFill/>
+        </p:spPr>
+        <p:txBody>
+          <a:bodyPr wrap="square">
+            <a:spAutoFit/>
+          </a:bodyPr>
+          <a:lstStyle/>
+          <a:p>
+            <a:r>
+              <a:rPr lang="en-US" altLang="zh-TW" dirty="0"/>
+              <a:t>Pseudocode:</a:t>
+            </a:r>
+          </a:p>
+          <a:p>
+            <a:endParaRPr lang="en-US" altLang="zh-TW" dirty="0"/>
+          </a:p>
+        </p:txBody>
+      </p:sp>
+      <p:pic>
+        <p:nvPicPr>
+          <p:cNvPr id="11" name="Picture 10">
+            <a:extLst>
+              <a:ext uri="{FF2B5EF4-FFF2-40B4-BE49-F238E27FC236}">
+                <a16:creationId xmlns:a16="http://schemas.microsoft.com/office/drawing/2014/main" id="{3A72012A-8C27-46CF-B1F0-77ACEE409B51}"/>
+              </a:ext>
+            </a:extLst>
+          </p:cNvPr>
+          <p:cNvPicPr>
+            <a:picLocks noChangeAspect="1"/>
+          </p:cNvPicPr>
+          <p:nvPr/>
+        </p:nvPicPr>
+        <p:blipFill>
+          <a:blip r:embed="rId2"/>
+          <a:stretch>
+            <a:fillRect/>
+          </a:stretch>
+        </p:blipFill>
+        <p:spPr>
+          <a:xfrm>
+            <a:off x="1264024" y="3041454"/>
+            <a:ext cx="9264864" cy="2552521"/>
+          </a:xfrm>
+          <a:prstGeom prst="rect">
+            <a:avLst/>
+          </a:prstGeom>
+        </p:spPr>
+      </p:pic>
+    </p:spTree>
+    <p:extLst>
+      <p:ext uri="{BB962C8B-B14F-4D97-AF65-F5344CB8AC3E}">
+        <p14:creationId xmlns:p14="http://schemas.microsoft.com/office/powerpoint/2010/main" val="133067467"/>
+      </p:ext>
+    </p:extLst>
+  </p:cSld>
+  <p:clrMapOvr>
+    <a:masterClrMapping/>
+  </p:clrMapOvr>
+</p:sld>
+</file>
+
 <file path=ppt/slides/slide2.xml><?xml version="1.0" encoding="utf-8"?>
 <p:sld xmlns:a="http://schemas.openxmlformats.org/drawingml/2006/main" xmlns:r="http://schemas.openxmlformats.org/officeDocument/2006/relationships" xmlns:p="http://schemas.openxmlformats.org/presentationml/2006/main">
   <p:cSld>
@@ -5916,86 +6463,6 @@
           </p:style>
         </p:cxnSp>
       </p:grpSp>
-      <p:cxnSp>
-        <p:nvCxnSpPr>
-          <p:cNvPr id="114" name="Straight Arrow Connector 113">
-            <a:extLst>
-              <a:ext uri="{FF2B5EF4-FFF2-40B4-BE49-F238E27FC236}">
-                <a16:creationId xmlns:a16="http://schemas.microsoft.com/office/drawing/2014/main" id="{4CFE2F39-209A-4FE6-930E-72C37DE1D220}"/>
-              </a:ext>
-            </a:extLst>
-          </p:cNvPr>
-          <p:cNvCxnSpPr>
-            <a:cxnSpLocks/>
-          </p:cNvCxnSpPr>
-          <p:nvPr/>
-        </p:nvCxnSpPr>
-        <p:spPr>
-          <a:xfrm>
-            <a:off x="5548356" y="5094283"/>
-            <a:ext cx="1035324" cy="0"/>
-          </a:xfrm>
-          <a:prstGeom prst="straightConnector1">
-            <a:avLst/>
-          </a:prstGeom>
-          <a:ln w="38100">
-            <a:solidFill>
-              <a:srgbClr val="0070C0"/>
-            </a:solidFill>
-            <a:tailEnd type="triangle"/>
-          </a:ln>
-        </p:spPr>
-        <p:style>
-          <a:lnRef idx="1">
-            <a:schemeClr val="accent1"/>
-          </a:lnRef>
-          <a:fillRef idx="0">
-            <a:schemeClr val="accent1"/>
-          </a:fillRef>
-          <a:effectRef idx="0">
-            <a:schemeClr val="accent1"/>
-          </a:effectRef>
-          <a:fontRef idx="minor">
-            <a:schemeClr val="tx1"/>
-          </a:fontRef>
-        </p:style>
-      </p:cxnSp>
-      <p:sp>
-        <p:nvSpPr>
-          <p:cNvPr id="117" name="TextBox 116">
-            <a:extLst>
-              <a:ext uri="{FF2B5EF4-FFF2-40B4-BE49-F238E27FC236}">
-                <a16:creationId xmlns:a16="http://schemas.microsoft.com/office/drawing/2014/main" id="{4C22E6D6-2107-424E-B845-FCB82496BFD2}"/>
-              </a:ext>
-            </a:extLst>
-          </p:cNvPr>
-          <p:cNvSpPr txBox="1"/>
-          <p:nvPr/>
-        </p:nvSpPr>
-        <p:spPr>
-          <a:xfrm>
-            <a:off x="5663271" y="4810500"/>
-            <a:ext cx="1051658" cy="276999"/>
-          </a:xfrm>
-          <a:prstGeom prst="rect">
-            <a:avLst/>
-          </a:prstGeom>
-          <a:noFill/>
-        </p:spPr>
-        <p:txBody>
-          <a:bodyPr wrap="square" rtlCol="0">
-            <a:spAutoFit/>
-          </a:bodyPr>
-          <a:lstStyle/>
-          <a:p>
-            <a:r>
-              <a:rPr lang="en-US" altLang="zh-TW" sz="1200" dirty="0"/>
-              <a:t>Result Image</a:t>
-            </a:r>
-            <a:endParaRPr lang="zh-TW" altLang="en-US" sz="1200" dirty="0"/>
-          </a:p>
-        </p:txBody>
-      </p:sp>
       <p:sp>
         <p:nvSpPr>
           <p:cNvPr id="118" name="Title 1">
@@ -6823,8 +7290,8 @@
         </p:nvSpPr>
         <p:spPr>
           <a:xfrm>
-            <a:off x="293047" y="5007641"/>
-            <a:ext cx="1051658" cy="276999"/>
+            <a:off x="54553" y="5014032"/>
+            <a:ext cx="1464516" cy="276999"/>
           </a:xfrm>
           <a:prstGeom prst="rect">
             <a:avLst/>
@@ -6839,8 +7306,9 @@
           <a:p>
             <a:r>
               <a:rPr lang="en-US" altLang="zh-TW" sz="1200" dirty="0"/>
-              <a:t>Mode [N,2]</a:t>
-            </a:r>
+              <a:t>LBP_Mode_n1[N,2]</a:t>
+            </a:r>
+            <a:endParaRPr lang="en-US" altLang="zh-TW" sz="1000" dirty="0"/>
           </a:p>
         </p:txBody>
       </p:sp>
@@ -7119,8 +7587,8 @@
         </p:nvSpPr>
         <p:spPr>
           <a:xfrm>
-            <a:off x="3781884" y="5144859"/>
-            <a:ext cx="889175" cy="276999"/>
+            <a:off x="3819733" y="4822131"/>
+            <a:ext cx="1636110" cy="276999"/>
           </a:xfrm>
           <a:prstGeom prst="rect">
             <a:avLst/>
@@ -7135,62 +7603,113 @@
           <a:p>
             <a:r>
               <a:rPr lang="en-US" altLang="zh-TW" sz="1200" dirty="0"/>
-              <a:t>Mask[L,W]</a:t>
+              <a:t>Image Result Mask[L,W]</a:t>
             </a:r>
             <a:endParaRPr lang="zh-TW" altLang="en-US" sz="1200" dirty="0"/>
           </a:p>
         </p:txBody>
       </p:sp>
-      <p:sp>
-        <p:nvSpPr>
-          <p:cNvPr id="183" name="Rectangle 182">
-            <a:extLst>
-              <a:ext uri="{FF2B5EF4-FFF2-40B4-BE49-F238E27FC236}">
-                <a16:creationId xmlns:a16="http://schemas.microsoft.com/office/drawing/2014/main" id="{11B9B09E-38A7-4F34-890A-F9562592AEA9}"/>
-              </a:ext>
-            </a:extLst>
-          </p:cNvPr>
-          <p:cNvSpPr/>
-          <p:nvPr/>
-        </p:nvSpPr>
-        <p:spPr>
-          <a:xfrm>
-            <a:off x="4533901" y="4609504"/>
-            <a:ext cx="1008000" cy="648000"/>
-          </a:xfrm>
-          <a:prstGeom prst="rect">
-            <a:avLst/>
-          </a:prstGeom>
-        </p:spPr>
-        <p:style>
-          <a:lnRef idx="2">
-            <a:schemeClr val="accent5">
-              <a:shade val="50000"/>
-            </a:schemeClr>
-          </a:lnRef>
-          <a:fillRef idx="1">
-            <a:schemeClr val="accent5"/>
-          </a:fillRef>
-          <a:effectRef idx="0">
-            <a:schemeClr val="accent5"/>
-          </a:effectRef>
-          <a:fontRef idx="minor">
-            <a:schemeClr val="lt1"/>
-          </a:fontRef>
-        </p:style>
-        <p:txBody>
-          <a:bodyPr rtlCol="0" anchor="ctr"/>
-          <a:lstStyle/>
-          <a:p>
-            <a:pPr algn="ctr"/>
-            <a:r>
-              <a:rPr lang="en-US" altLang="zh-TW" dirty="0"/>
-              <a:t>Labeling</a:t>
-            </a:r>
-            <a:endParaRPr lang="zh-TW" altLang="en-US" dirty="0"/>
-          </a:p>
-        </p:txBody>
-      </p:sp>
+      <p:grpSp>
+        <p:nvGrpSpPr>
+          <p:cNvPr id="64" name="Group 63">
+            <a:extLst>
+              <a:ext uri="{FF2B5EF4-FFF2-40B4-BE49-F238E27FC236}">
+                <a16:creationId xmlns:a16="http://schemas.microsoft.com/office/drawing/2014/main" id="{CB47365E-C99D-449D-A029-8F0283EB4825}"/>
+              </a:ext>
+            </a:extLst>
+          </p:cNvPr>
+          <p:cNvGrpSpPr/>
+          <p:nvPr/>
+        </p:nvGrpSpPr>
+        <p:grpSpPr>
+          <a:xfrm>
+            <a:off x="125513" y="4478723"/>
+            <a:ext cx="1393183" cy="283039"/>
+            <a:chOff x="994871" y="2977373"/>
+            <a:chExt cx="1393183" cy="283039"/>
+          </a:xfrm>
+        </p:grpSpPr>
+        <p:cxnSp>
+          <p:nvCxnSpPr>
+            <p:cNvPr id="65" name="Straight Arrow Connector 64">
+              <a:extLst>
+                <a:ext uri="{FF2B5EF4-FFF2-40B4-BE49-F238E27FC236}">
+                  <a16:creationId xmlns:a16="http://schemas.microsoft.com/office/drawing/2014/main" id="{464E4C5B-0805-42D3-9F1E-6BA55C2359E4}"/>
+                </a:ext>
+              </a:extLst>
+            </p:cNvPr>
+            <p:cNvCxnSpPr>
+              <a:cxnSpLocks/>
+            </p:cNvCxnSpPr>
+            <p:nvPr/>
+          </p:nvCxnSpPr>
+          <p:spPr>
+            <a:xfrm>
+              <a:off x="1365251" y="3260412"/>
+              <a:ext cx="645966" cy="0"/>
+            </a:xfrm>
+            <a:prstGeom prst="straightConnector1">
+              <a:avLst/>
+            </a:prstGeom>
+            <a:ln w="38100">
+              <a:solidFill>
+                <a:srgbClr val="0070C0"/>
+              </a:solidFill>
+              <a:tailEnd type="triangle"/>
+            </a:ln>
+          </p:spPr>
+          <p:style>
+            <a:lnRef idx="1">
+              <a:schemeClr val="accent1"/>
+            </a:lnRef>
+            <a:fillRef idx="0">
+              <a:schemeClr val="accent1"/>
+            </a:fillRef>
+            <a:effectRef idx="0">
+              <a:schemeClr val="accent1"/>
+            </a:effectRef>
+            <a:fontRef idx="minor">
+              <a:schemeClr val="tx1"/>
+            </a:fontRef>
+          </p:style>
+        </p:cxnSp>
+        <p:sp>
+          <p:nvSpPr>
+            <p:cNvPr id="66" name="TextBox 65">
+              <a:extLst>
+                <a:ext uri="{FF2B5EF4-FFF2-40B4-BE49-F238E27FC236}">
+                  <a16:creationId xmlns:a16="http://schemas.microsoft.com/office/drawing/2014/main" id="{328B385F-77CB-4067-94E0-6E471A886CCD}"/>
+                </a:ext>
+              </a:extLst>
+            </p:cNvPr>
+            <p:cNvSpPr txBox="1"/>
+            <p:nvPr/>
+          </p:nvSpPr>
+          <p:spPr>
+            <a:xfrm>
+              <a:off x="994871" y="2977373"/>
+              <a:ext cx="1393183" cy="276999"/>
+            </a:xfrm>
+            <a:prstGeom prst="rect">
+              <a:avLst/>
+            </a:prstGeom>
+            <a:noFill/>
+          </p:spPr>
+          <p:txBody>
+            <a:bodyPr wrap="square" rtlCol="0">
+              <a:spAutoFit/>
+            </a:bodyPr>
+            <a:lstStyle/>
+            <a:p>
+              <a:r>
+                <a:rPr lang="en-US" altLang="zh-TW" sz="1200" dirty="0"/>
+                <a:t>LBP_Mode_n0[N,2]</a:t>
+              </a:r>
+              <a:endParaRPr lang="en-US" altLang="zh-TW" sz="1000" dirty="0"/>
+            </a:p>
+          </p:txBody>
+        </p:sp>
+      </p:grpSp>
     </p:spTree>
     <p:extLst>
       <p:ext uri="{BB962C8B-B14F-4D97-AF65-F5344CB8AC3E}">
@@ -7239,7 +7758,7 @@
         </p:nvSpPr>
         <p:spPr>
           <a:xfrm>
-            <a:off x="838200" y="9525"/>
+            <a:off x="4275666" y="9525"/>
             <a:ext cx="3640667" cy="1325563"/>
           </a:xfrm>
         </p:spPr>
@@ -7247,6 +7766,7 @@
           <a:bodyPr/>
           <a:lstStyle/>
           <a:p>
+            <a:pPr algn="ctr"/>
             <a:r>
               <a:rPr lang="en-US" altLang="zh-TW" dirty="0"/>
               <a:t>Flowchart</a:t>
@@ -7269,8 +7789,8 @@
         </p:nvSpPr>
         <p:spPr>
           <a:xfrm>
-            <a:off x="4504267" y="174857"/>
-            <a:ext cx="2880000" cy="288000"/>
+            <a:off x="960883" y="9525"/>
+            <a:ext cx="3726000" cy="288000"/>
           </a:xfrm>
           <a:prstGeom prst="rect">
             <a:avLst/>
@@ -7330,8 +7850,8 @@
         </p:nvSpPr>
         <p:spPr>
           <a:xfrm>
-            <a:off x="4504267" y="647284"/>
-            <a:ext cx="2880000" cy="288000"/>
+            <a:off x="960883" y="481952"/>
+            <a:ext cx="3726000" cy="288000"/>
           </a:xfrm>
           <a:prstGeom prst="rect">
             <a:avLst/>
@@ -7384,8 +7904,8 @@
         </p:nvSpPr>
         <p:spPr>
           <a:xfrm>
-            <a:off x="4504267" y="1119712"/>
-            <a:ext cx="2880000" cy="288000"/>
+            <a:off x="961225" y="954380"/>
+            <a:ext cx="3726648" cy="288000"/>
           </a:xfrm>
           <a:prstGeom prst="rect">
             <a:avLst/>
@@ -7442,7 +7962,7 @@
         </p:nvCxnSpPr>
         <p:spPr>
           <a:xfrm>
-            <a:off x="5944267" y="462857"/>
+            <a:off x="2823883" y="297525"/>
             <a:ext cx="0" cy="184427"/>
           </a:xfrm>
           <a:prstGeom prst="straightConnector1">
@@ -7488,8 +8008,8 @@
         </p:nvCxnSpPr>
         <p:spPr>
           <a:xfrm>
-            <a:off x="5944267" y="935284"/>
-            <a:ext cx="0" cy="184428"/>
+            <a:off x="2823883" y="769952"/>
+            <a:ext cx="666" cy="184428"/>
           </a:xfrm>
           <a:prstGeom prst="straightConnector1">
             <a:avLst/>
@@ -7530,8 +8050,8 @@
         </p:nvSpPr>
         <p:spPr>
           <a:xfrm>
-            <a:off x="4504267" y="2667877"/>
-            <a:ext cx="2880000" cy="288000"/>
+            <a:off x="960231" y="3074678"/>
+            <a:ext cx="3726652" cy="605076"/>
           </a:xfrm>
           <a:prstGeom prst="rect">
             <a:avLst/>
@@ -7559,24 +8079,20 @@
           <a:p>
             <a:pPr algn="ctr"/>
             <a:r>
-              <a:rPr lang="zh-TW" altLang="en-US" sz="1600" dirty="0"/>
-              <a:t>取</a:t>
-            </a:r>
-            <a:r>
               <a:rPr lang="en-US" altLang="zh-TW" sz="1600" dirty="0" err="1"/>
-              <a:t>big_kernel</a:t>
+              <a:t>Get_kernel</a:t>
             </a:r>
             <a:r>
               <a:rPr lang="en-US" altLang="zh-TW" sz="1600" dirty="0"/>
-              <a:t>[</a:t>
+              <a:t>(Sobel, k=</a:t>
             </a:r>
             <a:r>
               <a:rPr lang="en-US" altLang="zh-TW" sz="1600" dirty="0" err="1"/>
-              <a:t>i,j</a:t>
+              <a:t>BFS_kernel_size</a:t>
             </a:r>
             <a:r>
               <a:rPr lang="en-US" altLang="zh-TW" sz="1600" dirty="0"/>
-              <a:t>]</a:t>
+              <a:t>, c=[last index + x, middle index + y])</a:t>
             </a:r>
           </a:p>
         </p:txBody>
@@ -7599,8 +8115,8 @@
         </p:nvCxnSpPr>
         <p:spPr>
           <a:xfrm>
-            <a:off x="5944267" y="1407712"/>
-            <a:ext cx="0" cy="729438"/>
+            <a:off x="2824549" y="1242380"/>
+            <a:ext cx="0" cy="366394"/>
           </a:xfrm>
           <a:prstGeom prst="straightConnector1">
             <a:avLst/>
@@ -7641,8 +8157,8 @@
         </p:nvSpPr>
         <p:spPr>
           <a:xfrm>
-            <a:off x="4504267" y="2137150"/>
-            <a:ext cx="2880000" cy="288000"/>
+            <a:off x="961223" y="1608774"/>
+            <a:ext cx="3726652" cy="288000"/>
           </a:xfrm>
           <a:prstGeom prst="rect">
             <a:avLst/>
@@ -7671,23 +8187,15 @@
             <a:pPr algn="ctr"/>
             <a:r>
               <a:rPr lang="zh-TW" altLang="en-US" sz="1600" dirty="0"/>
-              <a:t>取</a:t>
+              <a:t>宣告</a:t>
             </a:r>
             <a:r>
               <a:rPr lang="en-US" altLang="zh-TW" sz="1600" dirty="0" err="1"/>
-              <a:t>big_kernel</a:t>
+              <a:t>is_road_array</a:t>
             </a:r>
             <a:r>
               <a:rPr lang="en-US" altLang="zh-TW" sz="1600" dirty="0"/>
-              <a:t> (N</a:t>
-            </a:r>
-            <a:r>
-              <a:rPr lang="zh-TW" altLang="en-US" sz="1600" dirty="0"/>
-              <a:t> </a:t>
-            </a:r>
-            <a:r>
-              <a:rPr lang="en-US" altLang="zh-TW" sz="1600" dirty="0"/>
-              <a:t>x N Matrices)</a:t>
+              <a:t> (bool array) = [0,…,0]</a:t>
             </a:r>
           </a:p>
         </p:txBody>
@@ -7704,14 +8212,14 @@
           <p:cNvCxnSpPr>
             <a:cxnSpLocks/>
             <a:stCxn id="23" idx="2"/>
-            <a:endCxn id="15" idx="0"/>
+            <a:endCxn id="83" idx="0"/>
           </p:cNvCxnSpPr>
           <p:nvPr/>
         </p:nvCxnSpPr>
         <p:spPr>
-          <a:xfrm>
-            <a:off x="5944267" y="2425150"/>
-            <a:ext cx="0" cy="242727"/>
+          <a:xfrm flipH="1">
+            <a:off x="2823883" y="1896774"/>
+            <a:ext cx="666" cy="158443"/>
           </a:xfrm>
           <a:prstGeom prst="straightConnector1">
             <a:avLst/>
@@ -7752,8 +8260,8 @@
         </p:nvSpPr>
         <p:spPr>
           <a:xfrm>
-            <a:off x="4504267" y="3167615"/>
-            <a:ext cx="2880000" cy="288000"/>
+            <a:off x="960231" y="3971592"/>
+            <a:ext cx="3726652" cy="390464"/>
           </a:xfrm>
           <a:prstGeom prst="rect">
             <a:avLst/>
@@ -7781,58 +8289,24 @@
           <a:p>
             <a:pPr algn="ctr"/>
             <a:r>
+              <a:rPr lang="en-US" altLang="zh-TW" sz="1600" dirty="0" err="1"/>
+              <a:t>Get_LBP</a:t>
+            </a:r>
+            <a:r>
               <a:rPr lang="en-US" altLang="zh-TW" sz="1600" dirty="0"/>
-              <a:t>LBP</a:t>
-            </a:r>
-          </a:p>
-        </p:txBody>
-      </p:sp>
-      <p:cxnSp>
-        <p:nvCxnSpPr>
-          <p:cNvPr id="53" name="Straight Arrow Connector 52">
-            <a:extLst>
-              <a:ext uri="{FF2B5EF4-FFF2-40B4-BE49-F238E27FC236}">
-                <a16:creationId xmlns:a16="http://schemas.microsoft.com/office/drawing/2014/main" id="{03B17416-3FF9-4801-AE2A-30124331616B}"/>
-              </a:ext>
-            </a:extLst>
-          </p:cNvPr>
-          <p:cNvCxnSpPr>
-            <a:cxnSpLocks/>
-            <a:stCxn id="15" idx="2"/>
-            <a:endCxn id="52" idx="0"/>
-          </p:cNvCxnSpPr>
-          <p:nvPr/>
-        </p:nvCxnSpPr>
-        <p:spPr>
-          <a:xfrm>
-            <a:off x="5944267" y="2955877"/>
-            <a:ext cx="0" cy="211738"/>
-          </a:xfrm>
-          <a:prstGeom prst="straightConnector1">
-            <a:avLst/>
-          </a:prstGeom>
-          <a:ln w="38100">
-            <a:solidFill>
-              <a:srgbClr val="0070C0"/>
-            </a:solidFill>
-            <a:tailEnd type="triangle"/>
-          </a:ln>
-        </p:spPr>
-        <p:style>
-          <a:lnRef idx="1">
-            <a:schemeClr val="accent1"/>
-          </a:lnRef>
-          <a:fillRef idx="0">
-            <a:schemeClr val="accent1"/>
-          </a:fillRef>
-          <a:effectRef idx="0">
-            <a:schemeClr val="accent1"/>
-          </a:effectRef>
-          <a:fontRef idx="minor">
-            <a:schemeClr val="tx1"/>
-          </a:fontRef>
-        </p:style>
-      </p:cxnSp>
+              <a:t>(</a:t>
+            </a:r>
+            <a:r>
+              <a:rPr lang="en-US" altLang="zh-TW" sz="1600" dirty="0" err="1"/>
+              <a:t>kernel.Kernel_array</a:t>
+            </a:r>
+            <a:r>
+              <a:rPr lang="en-US" altLang="zh-TW" sz="1600" dirty="0"/>
+              <a:t>)</a:t>
+            </a:r>
+          </a:p>
+        </p:txBody>
+      </p:sp>
       <p:sp>
         <p:nvSpPr>
           <p:cNvPr id="55" name="Rectangle 54">
@@ -7847,8 +8321,8 @@
         </p:nvSpPr>
         <p:spPr>
           <a:xfrm>
-            <a:off x="4504267" y="3658141"/>
-            <a:ext cx="2880000" cy="288000"/>
+            <a:off x="960233" y="4792046"/>
+            <a:ext cx="3726648" cy="390464"/>
           </a:xfrm>
           <a:prstGeom prst="rect">
             <a:avLst/>
@@ -7876,12 +8350,20 @@
           <a:p>
             <a:pPr algn="ctr"/>
             <a:r>
-              <a:rPr lang="zh-TW" altLang="en-US" sz="1600" dirty="0"/>
-              <a:t>加到</a:t>
+              <a:rPr lang="en-US" altLang="zh-TW" sz="1600" dirty="0" err="1"/>
+              <a:t>sort_N_max_hist</a:t>
             </a:r>
             <a:r>
               <a:rPr lang="en-US" altLang="zh-TW" sz="1600" dirty="0"/>
-              <a:t>Histogram</a:t>
+              <a:t>(</a:t>
+            </a:r>
+            <a:r>
+              <a:rPr lang="en-US" altLang="zh-TW" sz="1600" dirty="0" err="1"/>
+              <a:t>LBP_hist</a:t>
+            </a:r>
+            <a:r>
+              <a:rPr lang="en-US" altLang="zh-TW" sz="1600" dirty="0"/>
+              <a:t>)</a:t>
             </a:r>
           </a:p>
         </p:txBody>
@@ -7897,15 +8379,14 @@
           </p:cNvPr>
           <p:cNvCxnSpPr>
             <a:cxnSpLocks/>
-            <a:stCxn id="52" idx="2"/>
             <a:endCxn id="55" idx="0"/>
           </p:cNvCxnSpPr>
           <p:nvPr/>
         </p:nvCxnSpPr>
         <p:spPr>
           <a:xfrm>
-            <a:off x="5944267" y="3455615"/>
-            <a:ext cx="0" cy="202526"/>
+            <a:off x="2823555" y="4362056"/>
+            <a:ext cx="2" cy="429990"/>
           </a:xfrm>
           <a:prstGeom prst="straightConnector1">
             <a:avLst/>
@@ -7946,8 +8427,8 @@
         </p:nvSpPr>
         <p:spPr>
           <a:xfrm>
-            <a:off x="4673601" y="4148667"/>
-            <a:ext cx="2540000" cy="575733"/>
+            <a:off x="1035235" y="2055217"/>
+            <a:ext cx="3577296" cy="707161"/>
           </a:xfrm>
           <a:prstGeom prst="flowChartDecision">
             <a:avLst/>
@@ -7975,12 +8456,16 @@
           <a:p>
             <a:pPr algn="ctr"/>
             <a:r>
+              <a:rPr lang="en-US" altLang="zh-TW" sz="1200" dirty="0"/>
+              <a:t>(u16) </a:t>
+            </a:r>
+            <a:r>
               <a:rPr lang="en-US" altLang="zh-TW" sz="1200" dirty="0" err="1"/>
-              <a:t>i</a:t>
+              <a:t>is_road_array</a:t>
             </a:r>
             <a:r>
               <a:rPr lang="en-US" altLang="zh-TW" sz="1200" dirty="0"/>
-              <a:t> or j &gt;= N?</a:t>
+              <a:t>== 0?</a:t>
             </a:r>
             <a:endParaRPr lang="zh-TW" altLang="en-US" sz="1200" dirty="0"/>
           </a:p>
@@ -7997,13 +8482,15 @@
           </p:cNvPr>
           <p:cNvCxnSpPr>
             <a:cxnSpLocks/>
+            <a:stCxn id="15" idx="2"/>
+            <a:endCxn id="52" idx="0"/>
           </p:cNvCxnSpPr>
           <p:nvPr/>
         </p:nvCxnSpPr>
         <p:spPr>
           <a:xfrm>
-            <a:off x="5944268" y="3946141"/>
-            <a:ext cx="0" cy="202526"/>
+            <a:off x="2823557" y="3679754"/>
+            <a:ext cx="0" cy="291838"/>
           </a:xfrm>
           <a:prstGeom prst="straightConnector1">
             <a:avLst/>
@@ -8030,52 +8517,6 @@
           </a:fontRef>
         </p:style>
       </p:cxnSp>
-      <p:cxnSp>
-        <p:nvCxnSpPr>
-          <p:cNvPr id="116" name="Connector: Elbow 115">
-            <a:extLst>
-              <a:ext uri="{FF2B5EF4-FFF2-40B4-BE49-F238E27FC236}">
-                <a16:creationId xmlns:a16="http://schemas.microsoft.com/office/drawing/2014/main" id="{787BE3D5-1968-4CC9-804D-CA1DB449C006}"/>
-              </a:ext>
-            </a:extLst>
-          </p:cNvPr>
-          <p:cNvCxnSpPr>
-            <a:cxnSpLocks/>
-            <a:stCxn id="83" idx="3"/>
-            <a:endCxn id="125" idx="2"/>
-          </p:cNvCxnSpPr>
-          <p:nvPr/>
-        </p:nvCxnSpPr>
-        <p:spPr>
-          <a:xfrm flipV="1">
-            <a:off x="7213601" y="3451009"/>
-            <a:ext cx="861630" cy="985525"/>
-          </a:xfrm>
-          <a:prstGeom prst="bentConnector2">
-            <a:avLst/>
-          </a:prstGeom>
-          <a:ln w="38100">
-            <a:solidFill>
-              <a:srgbClr val="0070C0"/>
-            </a:solidFill>
-            <a:tailEnd type="triangle"/>
-          </a:ln>
-        </p:spPr>
-        <p:style>
-          <a:lnRef idx="1">
-            <a:schemeClr val="accent1"/>
-          </a:lnRef>
-          <a:fillRef idx="0">
-            <a:schemeClr val="accent1"/>
-          </a:fillRef>
-          <a:effectRef idx="0">
-            <a:schemeClr val="accent1"/>
-          </a:effectRef>
-          <a:fontRef idx="minor">
-            <a:schemeClr val="tx1"/>
-          </a:fontRef>
-        </p:style>
-      </p:cxnSp>
       <p:sp>
         <p:nvSpPr>
           <p:cNvPr id="118" name="TextBox 117">
@@ -8090,7 +8531,7 @@
         </p:nvSpPr>
         <p:spPr>
           <a:xfrm>
-            <a:off x="7384267" y="4436533"/>
+            <a:off x="2914683" y="2736124"/>
             <a:ext cx="840699" cy="338554"/>
           </a:xfrm>
           <a:prstGeom prst="rect">
@@ -8106,7 +8547,7 @@
           <a:p>
             <a:r>
               <a:rPr lang="en-US" altLang="zh-TW" sz="1600" dirty="0"/>
-              <a:t>false</a:t>
+              <a:t>true</a:t>
             </a:r>
             <a:endParaRPr lang="zh-TW" altLang="en-US" sz="1600" dirty="0"/>
           </a:p>
@@ -8126,8 +8567,8 @@
         </p:nvSpPr>
         <p:spPr>
           <a:xfrm>
-            <a:off x="7568397" y="3163009"/>
-            <a:ext cx="1013668" cy="288000"/>
+            <a:off x="960231" y="5490810"/>
+            <a:ext cx="3726652" cy="390464"/>
           </a:xfrm>
           <a:prstGeom prst="rect">
             <a:avLst/>
@@ -8155,22 +8596,13 @@
           <a:p>
             <a:pPr algn="ctr"/>
             <a:r>
-              <a:rPr lang="zh-TW" altLang="en-US" sz="1600" dirty="0"/>
-              <a:t> </a:t>
-            </a:r>
-            <a:r>
               <a:rPr lang="en-US" altLang="zh-TW" sz="1600" dirty="0" err="1"/>
-              <a:t>i</a:t>
+              <a:t>count_dist</a:t>
             </a:r>
             <a:r>
               <a:rPr lang="en-US" altLang="zh-TW" sz="1600" dirty="0"/>
-              <a:t>++ or </a:t>
-            </a:r>
-            <a:r>
-              <a:rPr lang="en-US" altLang="zh-TW" sz="1600" dirty="0" err="1"/>
-              <a:t>j++</a:t>
-            </a:r>
-            <a:endParaRPr lang="en-US" altLang="zh-TW" sz="1600" dirty="0"/>
+              <a:t>(LBP_mode_n0, LBP_mode_n1)</a:t>
+            </a:r>
           </a:p>
         </p:txBody>
       </p:sp>
@@ -8185,18 +8617,19 @@
           </p:cNvPr>
           <p:cNvCxnSpPr>
             <a:cxnSpLocks/>
-            <a:stCxn id="125" idx="0"/>
             <a:endCxn id="15" idx="3"/>
           </p:cNvCxnSpPr>
           <p:nvPr/>
         </p:nvCxnSpPr>
         <p:spPr>
-          <a:xfrm rot="16200000" flipV="1">
-            <a:off x="7554183" y="2641961"/>
-            <a:ext cx="351132" cy="690964"/>
-          </a:xfrm>
-          <a:prstGeom prst="bentConnector2">
-            <a:avLst/>
+          <a:xfrm flipV="1">
+            <a:off x="2812473" y="3377216"/>
+            <a:ext cx="1874410" cy="1190229"/>
+          </a:xfrm>
+          <a:prstGeom prst="bentConnector3">
+            <a:avLst>
+              <a:gd name="adj1" fmla="val 112196"/>
+            </a:avLst>
           </a:prstGeom>
           <a:ln w="38100">
             <a:solidFill>
@@ -8231,13 +8664,15 @@
           </p:cNvPr>
           <p:cNvCxnSpPr>
             <a:cxnSpLocks/>
+            <a:stCxn id="83" idx="2"/>
+            <a:endCxn id="15" idx="0"/>
           </p:cNvCxnSpPr>
           <p:nvPr/>
         </p:nvCxnSpPr>
         <p:spPr>
-          <a:xfrm>
-            <a:off x="5943601" y="4724400"/>
-            <a:ext cx="0" cy="245533"/>
+          <a:xfrm flipH="1">
+            <a:off x="2823557" y="2762378"/>
+            <a:ext cx="326" cy="312300"/>
           </a:xfrm>
           <a:prstGeom prst="straightConnector1">
             <a:avLst/>
@@ -8266,10 +8701,396 @@
       </p:cxnSp>
       <p:sp>
         <p:nvSpPr>
-          <p:cNvPr id="133" name="Flowchart: Decision 132">
-            <a:extLst>
-              <a:ext uri="{FF2B5EF4-FFF2-40B4-BE49-F238E27FC236}">
-                <a16:creationId xmlns:a16="http://schemas.microsoft.com/office/drawing/2014/main" id="{1236B1A6-DC3E-4D5B-9F7A-DFC465EA623A}"/>
+          <p:cNvPr id="62" name="TextBox 61">
+            <a:extLst>
+              <a:ext uri="{FF2B5EF4-FFF2-40B4-BE49-F238E27FC236}">
+                <a16:creationId xmlns:a16="http://schemas.microsoft.com/office/drawing/2014/main" id="{987EF29C-F6BA-4D16-A361-AA90DF9402C6}"/>
+              </a:ext>
+            </a:extLst>
+          </p:cNvPr>
+          <p:cNvSpPr txBox="1"/>
+          <p:nvPr/>
+        </p:nvSpPr>
+        <p:spPr>
+          <a:xfrm>
+            <a:off x="2914521" y="3633038"/>
+            <a:ext cx="840699" cy="338554"/>
+          </a:xfrm>
+          <a:prstGeom prst="rect">
+            <a:avLst/>
+          </a:prstGeom>
+          <a:noFill/>
+        </p:spPr>
+        <p:txBody>
+          <a:bodyPr wrap="square" rtlCol="0">
+            <a:spAutoFit/>
+          </a:bodyPr>
+          <a:lstStyle/>
+          <a:p>
+            <a:r>
+              <a:rPr lang="en-US" altLang="zh-TW" sz="1600" dirty="0"/>
+              <a:t>kernel</a:t>
+            </a:r>
+            <a:endParaRPr lang="zh-TW" altLang="en-US" sz="1600" dirty="0"/>
+          </a:p>
+        </p:txBody>
+      </p:sp>
+      <p:sp>
+        <p:nvSpPr>
+          <p:cNvPr id="64" name="TextBox 63">
+            <a:extLst>
+              <a:ext uri="{FF2B5EF4-FFF2-40B4-BE49-F238E27FC236}">
+                <a16:creationId xmlns:a16="http://schemas.microsoft.com/office/drawing/2014/main" id="{E3AEF64F-0982-47EE-90C3-AEC2332079BB}"/>
+              </a:ext>
+            </a:extLst>
+          </p:cNvPr>
+          <p:cNvSpPr txBox="1"/>
+          <p:nvPr/>
+        </p:nvSpPr>
+        <p:spPr>
+          <a:xfrm flipH="1">
+            <a:off x="2914521" y="663919"/>
+            <a:ext cx="1255059" cy="369332"/>
+          </a:xfrm>
+          <a:prstGeom prst="rect">
+            <a:avLst/>
+          </a:prstGeom>
+          <a:noFill/>
+        </p:spPr>
+        <p:txBody>
+          <a:bodyPr wrap="square">
+            <a:spAutoFit/>
+          </a:bodyPr>
+          <a:lstStyle/>
+          <a:p>
+            <a:r>
+              <a:rPr lang="en-US" altLang="zh-TW" sz="1800" dirty="0" err="1"/>
+              <a:t>Gray_img</a:t>
+            </a:r>
+            <a:r>
+              <a:rPr lang="en-US" altLang="zh-TW" sz="1800" dirty="0"/>
+              <a:t> </a:t>
+            </a:r>
+            <a:endParaRPr lang="zh-TW" altLang="en-US" dirty="0"/>
+          </a:p>
+        </p:txBody>
+      </p:sp>
+      <p:sp>
+        <p:nvSpPr>
+          <p:cNvPr id="65" name="TextBox 64">
+            <a:extLst>
+              <a:ext uri="{FF2B5EF4-FFF2-40B4-BE49-F238E27FC236}">
+                <a16:creationId xmlns:a16="http://schemas.microsoft.com/office/drawing/2014/main" id="{62F810FF-1A79-4D9C-BCE2-D47C6A4C6F23}"/>
+              </a:ext>
+            </a:extLst>
+          </p:cNvPr>
+          <p:cNvSpPr txBox="1"/>
+          <p:nvPr/>
+        </p:nvSpPr>
+        <p:spPr>
+          <a:xfrm flipH="1">
+            <a:off x="2914521" y="1149922"/>
+            <a:ext cx="1255059" cy="369332"/>
+          </a:xfrm>
+          <a:prstGeom prst="rect">
+            <a:avLst/>
+          </a:prstGeom>
+          <a:noFill/>
+        </p:spPr>
+        <p:txBody>
+          <a:bodyPr wrap="square">
+            <a:spAutoFit/>
+          </a:bodyPr>
+          <a:lstStyle/>
+          <a:p>
+            <a:r>
+              <a:rPr lang="en-US" altLang="zh-TW" sz="1800" dirty="0" err="1"/>
+              <a:t>Sobel_img</a:t>
+            </a:r>
+            <a:r>
+              <a:rPr lang="en-US" altLang="zh-TW" sz="1800" dirty="0"/>
+              <a:t> </a:t>
+            </a:r>
+            <a:endParaRPr lang="zh-TW" altLang="en-US" dirty="0"/>
+          </a:p>
+        </p:txBody>
+      </p:sp>
+      <p:sp>
+        <p:nvSpPr>
+          <p:cNvPr id="66" name="TextBox 65">
+            <a:extLst>
+              <a:ext uri="{FF2B5EF4-FFF2-40B4-BE49-F238E27FC236}">
+                <a16:creationId xmlns:a16="http://schemas.microsoft.com/office/drawing/2014/main" id="{62FF6418-58DC-4429-AB3C-C4C4F53B8254}"/>
+              </a:ext>
+            </a:extLst>
+          </p:cNvPr>
+          <p:cNvSpPr txBox="1"/>
+          <p:nvPr/>
+        </p:nvSpPr>
+        <p:spPr>
+          <a:xfrm flipH="1">
+            <a:off x="2914519" y="175514"/>
+            <a:ext cx="1442327" cy="369332"/>
+          </a:xfrm>
+          <a:prstGeom prst="rect">
+            <a:avLst/>
+          </a:prstGeom>
+          <a:noFill/>
+        </p:spPr>
+        <p:txBody>
+          <a:bodyPr wrap="square">
+            <a:spAutoFit/>
+          </a:bodyPr>
+          <a:lstStyle/>
+          <a:p>
+            <a:r>
+              <a:rPr lang="en-US" altLang="zh-TW" sz="1800" dirty="0" err="1"/>
+              <a:t>Source_img</a:t>
+            </a:r>
+            <a:endParaRPr lang="zh-TW" altLang="en-US" dirty="0"/>
+          </a:p>
+        </p:txBody>
+      </p:sp>
+      <p:sp>
+        <p:nvSpPr>
+          <p:cNvPr id="78" name="TextBox 77">
+            <a:extLst>
+              <a:ext uri="{FF2B5EF4-FFF2-40B4-BE49-F238E27FC236}">
+                <a16:creationId xmlns:a16="http://schemas.microsoft.com/office/drawing/2014/main" id="{EE6ED0D1-96E4-4C2F-9FD7-0F790D781551}"/>
+              </a:ext>
+            </a:extLst>
+          </p:cNvPr>
+          <p:cNvSpPr txBox="1"/>
+          <p:nvPr/>
+        </p:nvSpPr>
+        <p:spPr>
+          <a:xfrm>
+            <a:off x="1650495" y="4311488"/>
+            <a:ext cx="1325787" cy="338554"/>
+          </a:xfrm>
+          <a:prstGeom prst="rect">
+            <a:avLst/>
+          </a:prstGeom>
+          <a:noFill/>
+        </p:spPr>
+        <p:txBody>
+          <a:bodyPr wrap="square" rtlCol="0">
+            <a:spAutoFit/>
+          </a:bodyPr>
+          <a:lstStyle/>
+          <a:p>
+            <a:r>
+              <a:rPr lang="en-US" altLang="zh-TW" sz="1600" dirty="0"/>
+              <a:t>LBP_hist_n0</a:t>
+            </a:r>
+            <a:endParaRPr lang="zh-TW" altLang="en-US" sz="1600" dirty="0"/>
+          </a:p>
+        </p:txBody>
+      </p:sp>
+      <p:cxnSp>
+        <p:nvCxnSpPr>
+          <p:cNvPr id="90" name="Straight Arrow Connector 89">
+            <a:extLst>
+              <a:ext uri="{FF2B5EF4-FFF2-40B4-BE49-F238E27FC236}">
+                <a16:creationId xmlns:a16="http://schemas.microsoft.com/office/drawing/2014/main" id="{0E97F150-6F7A-4B7F-96DD-2B0D2B8A9E1E}"/>
+              </a:ext>
+            </a:extLst>
+          </p:cNvPr>
+          <p:cNvCxnSpPr>
+            <a:cxnSpLocks/>
+            <a:stCxn id="55" idx="2"/>
+            <a:endCxn id="125" idx="0"/>
+          </p:cNvCxnSpPr>
+          <p:nvPr/>
+        </p:nvCxnSpPr>
+        <p:spPr>
+          <a:xfrm>
+            <a:off x="2823557" y="5182510"/>
+            <a:ext cx="0" cy="308300"/>
+          </a:xfrm>
+          <a:prstGeom prst="straightConnector1">
+            <a:avLst/>
+          </a:prstGeom>
+          <a:ln w="38100">
+            <a:solidFill>
+              <a:srgbClr val="0070C0"/>
+            </a:solidFill>
+            <a:tailEnd type="triangle"/>
+          </a:ln>
+        </p:spPr>
+        <p:style>
+          <a:lnRef idx="1">
+            <a:schemeClr val="accent1"/>
+          </a:lnRef>
+          <a:fillRef idx="0">
+            <a:schemeClr val="accent1"/>
+          </a:fillRef>
+          <a:effectRef idx="0">
+            <a:schemeClr val="accent1"/>
+          </a:effectRef>
+          <a:fontRef idx="minor">
+            <a:schemeClr val="tx1"/>
+          </a:fontRef>
+        </p:style>
+      </p:cxnSp>
+      <p:sp>
+        <p:nvSpPr>
+          <p:cNvPr id="97" name="TextBox 96">
+            <a:extLst>
+              <a:ext uri="{FF2B5EF4-FFF2-40B4-BE49-F238E27FC236}">
+                <a16:creationId xmlns:a16="http://schemas.microsoft.com/office/drawing/2014/main" id="{94BB73DC-C0F5-4862-944D-02908B746B04}"/>
+              </a:ext>
+            </a:extLst>
+          </p:cNvPr>
+          <p:cNvSpPr txBox="1"/>
+          <p:nvPr/>
+        </p:nvSpPr>
+        <p:spPr>
+          <a:xfrm>
+            <a:off x="4931580" y="3047501"/>
+            <a:ext cx="1003055" cy="954107"/>
+          </a:xfrm>
+          <a:prstGeom prst="rect">
+            <a:avLst/>
+          </a:prstGeom>
+          <a:noFill/>
+        </p:spPr>
+        <p:txBody>
+          <a:bodyPr wrap="square" rtlCol="0">
+            <a:spAutoFit/>
+          </a:bodyPr>
+          <a:lstStyle/>
+          <a:p>
+            <a:r>
+              <a:rPr lang="en-US" altLang="zh-TW" sz="1400" dirty="0"/>
+              <a:t>Increment and decrement x y</a:t>
+            </a:r>
+            <a:endParaRPr lang="zh-TW" altLang="en-US" sz="1400" dirty="0"/>
+          </a:p>
+        </p:txBody>
+      </p:sp>
+      <p:sp>
+        <p:nvSpPr>
+          <p:cNvPr id="99" name="TextBox 98">
+            <a:extLst>
+              <a:ext uri="{FF2B5EF4-FFF2-40B4-BE49-F238E27FC236}">
+                <a16:creationId xmlns:a16="http://schemas.microsoft.com/office/drawing/2014/main" id="{CEF8B242-F077-4149-9A7B-50A394FEE7C5}"/>
+              </a:ext>
+            </a:extLst>
+          </p:cNvPr>
+          <p:cNvSpPr txBox="1"/>
+          <p:nvPr/>
+        </p:nvSpPr>
+        <p:spPr>
+          <a:xfrm>
+            <a:off x="2834642" y="4318234"/>
+            <a:ext cx="1234828" cy="338554"/>
+          </a:xfrm>
+          <a:prstGeom prst="rect">
+            <a:avLst/>
+          </a:prstGeom>
+          <a:noFill/>
+        </p:spPr>
+        <p:txBody>
+          <a:bodyPr wrap="square" rtlCol="0">
+            <a:spAutoFit/>
+          </a:bodyPr>
+          <a:lstStyle/>
+          <a:p>
+            <a:r>
+              <a:rPr lang="en-US" altLang="zh-TW" sz="1600" dirty="0"/>
+              <a:t>LBP_hist_n1</a:t>
+            </a:r>
+            <a:endParaRPr lang="zh-TW" altLang="en-US" sz="1600" dirty="0"/>
+          </a:p>
+        </p:txBody>
+      </p:sp>
+      <p:sp>
+        <p:nvSpPr>
+          <p:cNvPr id="103" name="TextBox 102">
+            <a:extLst>
+              <a:ext uri="{FF2B5EF4-FFF2-40B4-BE49-F238E27FC236}">
+                <a16:creationId xmlns:a16="http://schemas.microsoft.com/office/drawing/2014/main" id="{BC449207-99A5-488B-83F1-A41179FFA822}"/>
+              </a:ext>
+            </a:extLst>
+          </p:cNvPr>
+          <p:cNvSpPr txBox="1"/>
+          <p:nvPr/>
+        </p:nvSpPr>
+        <p:spPr>
+          <a:xfrm>
+            <a:off x="2834642" y="5136980"/>
+            <a:ext cx="1629780" cy="338554"/>
+          </a:xfrm>
+          <a:prstGeom prst="rect">
+            <a:avLst/>
+          </a:prstGeom>
+          <a:noFill/>
+        </p:spPr>
+        <p:txBody>
+          <a:bodyPr wrap="square" rtlCol="0">
+            <a:spAutoFit/>
+          </a:bodyPr>
+          <a:lstStyle/>
+          <a:p>
+            <a:r>
+              <a:rPr lang="en-US" altLang="zh-TW" sz="1600" dirty="0"/>
+              <a:t>LBP</a:t>
+            </a:r>
+            <a:r>
+              <a:rPr lang="en-US" altLang="zh-TW" sz="1600"/>
+              <a:t>_mode</a:t>
+            </a:r>
+            <a:r>
+              <a:rPr lang="en-US" altLang="zh-TW" sz="1600" dirty="0"/>
+              <a:t>_n1</a:t>
+            </a:r>
+            <a:endParaRPr lang="zh-TW" altLang="en-US" sz="1600" dirty="0"/>
+          </a:p>
+        </p:txBody>
+      </p:sp>
+      <p:sp>
+        <p:nvSpPr>
+          <p:cNvPr id="104" name="TextBox 103">
+            <a:extLst>
+              <a:ext uri="{FF2B5EF4-FFF2-40B4-BE49-F238E27FC236}">
+                <a16:creationId xmlns:a16="http://schemas.microsoft.com/office/drawing/2014/main" id="{F8CD0D8D-0A95-47A2-B7A7-078D8199FB6A}"/>
+              </a:ext>
+            </a:extLst>
+          </p:cNvPr>
+          <p:cNvSpPr txBox="1"/>
+          <p:nvPr/>
+        </p:nvSpPr>
+        <p:spPr>
+          <a:xfrm>
+            <a:off x="1420014" y="5127442"/>
+            <a:ext cx="1629780" cy="338554"/>
+          </a:xfrm>
+          <a:prstGeom prst="rect">
+            <a:avLst/>
+          </a:prstGeom>
+          <a:noFill/>
+        </p:spPr>
+        <p:txBody>
+          <a:bodyPr wrap="square" rtlCol="0">
+            <a:spAutoFit/>
+          </a:bodyPr>
+          <a:lstStyle/>
+          <a:p>
+            <a:r>
+              <a:rPr lang="en-US" altLang="zh-TW" sz="1600" dirty="0"/>
+              <a:t>LBP_mode_n0</a:t>
+            </a:r>
+            <a:endParaRPr lang="zh-TW" altLang="en-US" sz="1600" dirty="0"/>
+          </a:p>
+        </p:txBody>
+      </p:sp>
+      <p:sp>
+        <p:nvSpPr>
+          <p:cNvPr id="106" name="Rectangle 105">
+            <a:extLst>
+              <a:ext uri="{FF2B5EF4-FFF2-40B4-BE49-F238E27FC236}">
+                <a16:creationId xmlns:a16="http://schemas.microsoft.com/office/drawing/2014/main" id="{75930C0C-3DCF-4FA4-A04A-0AFDF7E0B2FE}"/>
               </a:ext>
             </a:extLst>
           </p:cNvPr>
@@ -8278,10 +9099,10 @@
         </p:nvSpPr>
         <p:spPr>
           <a:xfrm>
-            <a:off x="4673601" y="4982633"/>
-            <a:ext cx="2540000" cy="575733"/>
-          </a:xfrm>
-          <a:prstGeom prst="flowChartDecision">
+            <a:off x="960229" y="6088048"/>
+            <a:ext cx="3726652" cy="450632"/>
+          </a:xfrm>
+          <a:prstGeom prst="rect">
             <a:avLst/>
           </a:prstGeom>
         </p:spPr>
@@ -8307,14 +9128,982 @@
           <a:p>
             <a:pPr algn="ctr"/>
             <a:r>
-              <a:rPr lang="en-US" altLang="zh-TW" sz="1200" dirty="0" err="1"/>
-              <a:t>i</a:t>
-            </a:r>
-            <a:r>
-              <a:rPr lang="en-US" altLang="zh-TW" sz="1200" dirty="0"/>
-              <a:t> or j &gt;= N?</a:t>
-            </a:r>
-            <a:endParaRPr lang="zh-TW" altLang="en-US" sz="1200" dirty="0"/>
+              <a:rPr lang="en-US" altLang="zh-TW" sz="1600" dirty="0" err="1"/>
+              <a:t>dist_compare</a:t>
+            </a:r>
+            <a:r>
+              <a:rPr lang="en-US" altLang="zh-TW" sz="1600" dirty="0"/>
+              <a:t>(</a:t>
+            </a:r>
+            <a:r>
+              <a:rPr lang="en-US" altLang="zh-TW" sz="1800" kern="1200" dirty="0" err="1">
+                <a:effectLst/>
+                <a:latin typeface="Calibri" panose="020F0502020204030204" pitchFamily="34" charset="0"/>
+                <a:ea typeface="新細明體" panose="02020500000000000000" pitchFamily="18" charset="-120"/>
+                <a:cs typeface="Times New Roman" panose="02020603050405020304" pitchFamily="18" charset="0"/>
+              </a:rPr>
+              <a:t>dist</a:t>
+            </a:r>
+            <a:r>
+              <a:rPr lang="en-US" altLang="zh-TW" sz="1800" kern="1200" dirty="0">
+                <a:effectLst/>
+                <a:latin typeface="Calibri" panose="020F0502020204030204" pitchFamily="34" charset="0"/>
+                <a:ea typeface="新細明體" panose="02020500000000000000" pitchFamily="18" charset="-120"/>
+                <a:cs typeface="Times New Roman" panose="02020603050405020304" pitchFamily="18" charset="0"/>
+              </a:rPr>
+              <a:t>, *Mask)</a:t>
+            </a:r>
+            <a:endParaRPr lang="en-US" altLang="zh-TW" sz="1600" dirty="0"/>
+          </a:p>
+        </p:txBody>
+      </p:sp>
+      <p:sp>
+        <p:nvSpPr>
+          <p:cNvPr id="112" name="TextBox 111">
+            <a:extLst>
+              <a:ext uri="{FF2B5EF4-FFF2-40B4-BE49-F238E27FC236}">
+                <a16:creationId xmlns:a16="http://schemas.microsoft.com/office/drawing/2014/main" id="{D4FBDF1E-8A73-4A8E-9CF5-716B9EE38315}"/>
+              </a:ext>
+            </a:extLst>
+          </p:cNvPr>
+          <p:cNvSpPr txBox="1"/>
+          <p:nvPr/>
+        </p:nvSpPr>
+        <p:spPr>
+          <a:xfrm>
+            <a:off x="2915785" y="5771430"/>
+            <a:ext cx="573743" cy="338554"/>
+          </a:xfrm>
+          <a:prstGeom prst="rect">
+            <a:avLst/>
+          </a:prstGeom>
+          <a:noFill/>
+        </p:spPr>
+        <p:txBody>
+          <a:bodyPr wrap="square" rtlCol="0">
+            <a:spAutoFit/>
+          </a:bodyPr>
+          <a:lstStyle/>
+          <a:p>
+            <a:r>
+              <a:rPr lang="en-US" altLang="zh-TW" sz="1600" dirty="0" err="1"/>
+              <a:t>dist</a:t>
+            </a:r>
+            <a:endParaRPr lang="zh-TW" altLang="en-US" sz="1600" dirty="0"/>
+          </a:p>
+        </p:txBody>
+      </p:sp>
+      <p:sp>
+        <p:nvSpPr>
+          <p:cNvPr id="117" name="Rectangle 116">
+            <a:extLst>
+              <a:ext uri="{FF2B5EF4-FFF2-40B4-BE49-F238E27FC236}">
+                <a16:creationId xmlns:a16="http://schemas.microsoft.com/office/drawing/2014/main" id="{B703F19E-CF5F-41E8-B5CE-480573B19062}"/>
+              </a:ext>
+            </a:extLst>
+          </p:cNvPr>
+          <p:cNvSpPr/>
+          <p:nvPr/>
+        </p:nvSpPr>
+        <p:spPr>
+          <a:xfrm>
+            <a:off x="7737208" y="2213566"/>
+            <a:ext cx="3726652" cy="390464"/>
+          </a:xfrm>
+          <a:prstGeom prst="rect">
+            <a:avLst/>
+          </a:prstGeom>
+        </p:spPr>
+        <p:style>
+          <a:lnRef idx="2">
+            <a:schemeClr val="accent1">
+              <a:shade val="50000"/>
+            </a:schemeClr>
+          </a:lnRef>
+          <a:fillRef idx="1">
+            <a:schemeClr val="accent1"/>
+          </a:fillRef>
+          <a:effectRef idx="0">
+            <a:schemeClr val="accent1"/>
+          </a:effectRef>
+          <a:fontRef idx="minor">
+            <a:schemeClr val="lt1"/>
+          </a:fontRef>
+        </p:style>
+        <p:txBody>
+          <a:bodyPr rtlCol="0" anchor="ctr"/>
+          <a:lstStyle/>
+          <a:p>
+            <a:pPr algn="ctr"/>
+            <a:r>
+              <a:rPr lang="zh-TW" altLang="en-US" sz="1600" dirty="0"/>
+              <a:t>結束</a:t>
+            </a:r>
+            <a:endParaRPr lang="en-US" altLang="zh-TW" sz="1600" dirty="0"/>
+          </a:p>
+        </p:txBody>
+      </p:sp>
+      <p:cxnSp>
+        <p:nvCxnSpPr>
+          <p:cNvPr id="134" name="Straight Arrow Connector 133">
+            <a:extLst>
+              <a:ext uri="{FF2B5EF4-FFF2-40B4-BE49-F238E27FC236}">
+                <a16:creationId xmlns:a16="http://schemas.microsoft.com/office/drawing/2014/main" id="{5B594E7A-CFF6-4378-BD3D-83A80DBE96F8}"/>
+              </a:ext>
+            </a:extLst>
+          </p:cNvPr>
+          <p:cNvCxnSpPr>
+            <a:cxnSpLocks/>
+            <a:stCxn id="125" idx="2"/>
+            <a:endCxn id="106" idx="0"/>
+          </p:cNvCxnSpPr>
+          <p:nvPr/>
+        </p:nvCxnSpPr>
+        <p:spPr>
+          <a:xfrm flipH="1">
+            <a:off x="2823555" y="5881274"/>
+            <a:ext cx="2" cy="206774"/>
+          </a:xfrm>
+          <a:prstGeom prst="straightConnector1">
+            <a:avLst/>
+          </a:prstGeom>
+          <a:ln w="38100">
+            <a:solidFill>
+              <a:srgbClr val="0070C0"/>
+            </a:solidFill>
+            <a:tailEnd type="triangle"/>
+          </a:ln>
+        </p:spPr>
+        <p:style>
+          <a:lnRef idx="1">
+            <a:schemeClr val="accent1"/>
+          </a:lnRef>
+          <a:fillRef idx="0">
+            <a:schemeClr val="accent1"/>
+          </a:fillRef>
+          <a:effectRef idx="0">
+            <a:schemeClr val="accent1"/>
+          </a:effectRef>
+          <a:fontRef idx="minor">
+            <a:schemeClr val="tx1"/>
+          </a:fontRef>
+        </p:style>
+      </p:cxnSp>
+      <p:cxnSp>
+        <p:nvCxnSpPr>
+          <p:cNvPr id="138" name="Connector: Elbow 137">
+            <a:extLst>
+              <a:ext uri="{FF2B5EF4-FFF2-40B4-BE49-F238E27FC236}">
+                <a16:creationId xmlns:a16="http://schemas.microsoft.com/office/drawing/2014/main" id="{9F5CADE7-34FD-45B3-99D7-B7F708C7F395}"/>
+              </a:ext>
+            </a:extLst>
+          </p:cNvPr>
+          <p:cNvCxnSpPr>
+            <a:cxnSpLocks/>
+            <a:stCxn id="106" idx="2"/>
+            <a:endCxn id="83" idx="1"/>
+          </p:cNvCxnSpPr>
+          <p:nvPr/>
+        </p:nvCxnSpPr>
+        <p:spPr>
+          <a:xfrm rot="5400000" flipH="1">
+            <a:off x="-135546" y="3579579"/>
+            <a:ext cx="4129882" cy="1788320"/>
+          </a:xfrm>
+          <a:prstGeom prst="bentConnector4">
+            <a:avLst>
+              <a:gd name="adj1" fmla="val -5535"/>
+              <a:gd name="adj2" fmla="val 116977"/>
+            </a:avLst>
+          </a:prstGeom>
+          <a:ln w="38100">
+            <a:solidFill>
+              <a:srgbClr val="0070C0"/>
+            </a:solidFill>
+            <a:tailEnd type="triangle"/>
+          </a:ln>
+        </p:spPr>
+        <p:style>
+          <a:lnRef idx="1">
+            <a:schemeClr val="accent1"/>
+          </a:lnRef>
+          <a:fillRef idx="0">
+            <a:schemeClr val="accent1"/>
+          </a:fillRef>
+          <a:effectRef idx="0">
+            <a:schemeClr val="accent1"/>
+          </a:effectRef>
+          <a:fontRef idx="minor">
+            <a:schemeClr val="tx1"/>
+          </a:fontRef>
+        </p:style>
+      </p:cxnSp>
+      <p:sp>
+        <p:nvSpPr>
+          <p:cNvPr id="150" name="TextBox 149">
+            <a:extLst>
+              <a:ext uri="{FF2B5EF4-FFF2-40B4-BE49-F238E27FC236}">
+                <a16:creationId xmlns:a16="http://schemas.microsoft.com/office/drawing/2014/main" id="{515FADF7-95BD-4B21-A512-2AF5C550A747}"/>
+              </a:ext>
+            </a:extLst>
+          </p:cNvPr>
+          <p:cNvSpPr txBox="1"/>
+          <p:nvPr/>
+        </p:nvSpPr>
+        <p:spPr>
+          <a:xfrm>
+            <a:off x="699319" y="6440405"/>
+            <a:ext cx="1446480" cy="338554"/>
+          </a:xfrm>
+          <a:prstGeom prst="rect">
+            <a:avLst/>
+          </a:prstGeom>
+          <a:noFill/>
+        </p:spPr>
+        <p:txBody>
+          <a:bodyPr wrap="square" rtlCol="0">
+            <a:spAutoFit/>
+          </a:bodyPr>
+          <a:lstStyle/>
+          <a:p>
+            <a:r>
+              <a:rPr lang="en-US" altLang="zh-TW" sz="1600" dirty="0" err="1"/>
+              <a:t>is_road_array</a:t>
+            </a:r>
+            <a:endParaRPr lang="zh-TW" altLang="en-US" sz="1600" dirty="0"/>
+          </a:p>
+        </p:txBody>
+      </p:sp>
+      <p:cxnSp>
+        <p:nvCxnSpPr>
+          <p:cNvPr id="157" name="Straight Arrow Connector 156">
+            <a:extLst>
+              <a:ext uri="{FF2B5EF4-FFF2-40B4-BE49-F238E27FC236}">
+                <a16:creationId xmlns:a16="http://schemas.microsoft.com/office/drawing/2014/main" id="{8CDBE494-50C7-49EB-B938-652B06A593C5}"/>
+              </a:ext>
+            </a:extLst>
+          </p:cNvPr>
+          <p:cNvCxnSpPr>
+            <a:cxnSpLocks/>
+          </p:cNvCxnSpPr>
+          <p:nvPr/>
+        </p:nvCxnSpPr>
+        <p:spPr>
+          <a:xfrm flipH="1">
+            <a:off x="4686881" y="6355554"/>
+            <a:ext cx="494719" cy="0"/>
+          </a:xfrm>
+          <a:prstGeom prst="straightConnector1">
+            <a:avLst/>
+          </a:prstGeom>
+          <a:ln w="57150">
+            <a:solidFill>
+              <a:srgbClr val="FF0000"/>
+            </a:solidFill>
+            <a:tailEnd type="triangle"/>
+          </a:ln>
+        </p:spPr>
+        <p:style>
+          <a:lnRef idx="1">
+            <a:schemeClr val="accent1"/>
+          </a:lnRef>
+          <a:fillRef idx="0">
+            <a:schemeClr val="accent1"/>
+          </a:fillRef>
+          <a:effectRef idx="0">
+            <a:schemeClr val="accent1"/>
+          </a:effectRef>
+          <a:fontRef idx="minor">
+            <a:schemeClr val="tx1"/>
+          </a:fontRef>
+        </p:style>
+      </p:cxnSp>
+      <p:sp>
+        <p:nvSpPr>
+          <p:cNvPr id="161" name="TextBox 160">
+            <a:extLst>
+              <a:ext uri="{FF2B5EF4-FFF2-40B4-BE49-F238E27FC236}">
+                <a16:creationId xmlns:a16="http://schemas.microsoft.com/office/drawing/2014/main" id="{8289AC47-94A1-445A-8207-2E246A60F1D6}"/>
+              </a:ext>
+            </a:extLst>
+          </p:cNvPr>
+          <p:cNvSpPr txBox="1"/>
+          <p:nvPr/>
+        </p:nvSpPr>
+        <p:spPr>
+          <a:xfrm>
+            <a:off x="5181600" y="5678924"/>
+            <a:ext cx="1788321" cy="1169551"/>
+          </a:xfrm>
+          <a:prstGeom prst="rect">
+            <a:avLst/>
+          </a:prstGeom>
+          <a:noFill/>
+        </p:spPr>
+        <p:txBody>
+          <a:bodyPr wrap="square">
+            <a:spAutoFit/>
+          </a:bodyPr>
+          <a:lstStyle/>
+          <a:p>
+            <a:r>
+              <a:rPr lang="en-US" altLang="zh-TW" sz="1400" kern="1200" dirty="0" err="1">
+                <a:effectLst/>
+                <a:latin typeface="Calibri" panose="020F0502020204030204" pitchFamily="34" charset="0"/>
+                <a:ea typeface="新細明體" panose="02020500000000000000" pitchFamily="18" charset="-120"/>
+                <a:cs typeface="Times New Roman" panose="02020603050405020304" pitchFamily="18" charset="0"/>
+              </a:rPr>
+              <a:t>Kernel.start_x</a:t>
+            </a:r>
+            <a:endParaRPr lang="en-US" altLang="zh-TW" sz="1400" dirty="0">
+              <a:latin typeface="Calibri" panose="020F0502020204030204" pitchFamily="34" charset="0"/>
+              <a:ea typeface="新細明體" panose="02020500000000000000" pitchFamily="18" charset="-120"/>
+              <a:cs typeface="Times New Roman" panose="02020603050405020304" pitchFamily="18" charset="0"/>
+            </a:endParaRPr>
+          </a:p>
+          <a:p>
+            <a:r>
+              <a:rPr lang="en-US" altLang="zh-TW" sz="1400" kern="1200" dirty="0" err="1">
+                <a:effectLst/>
+                <a:latin typeface="Calibri" panose="020F0502020204030204" pitchFamily="34" charset="0"/>
+                <a:ea typeface="新細明體" panose="02020500000000000000" pitchFamily="18" charset="-120"/>
+                <a:cs typeface="Times New Roman" panose="02020603050405020304" pitchFamily="18" charset="0"/>
+              </a:rPr>
+              <a:t>Kernel.start_y</a:t>
+            </a:r>
+            <a:endParaRPr lang="en-US" altLang="zh-TW" sz="1400" kern="1200" dirty="0">
+              <a:effectLst/>
+              <a:latin typeface="Calibri" panose="020F0502020204030204" pitchFamily="34" charset="0"/>
+              <a:ea typeface="新細明體" panose="02020500000000000000" pitchFamily="18" charset="-120"/>
+              <a:cs typeface="Times New Roman" panose="02020603050405020304" pitchFamily="18" charset="0"/>
+            </a:endParaRPr>
+          </a:p>
+          <a:p>
+            <a:r>
+              <a:rPr lang="en-US" altLang="zh-TW" sz="1400" dirty="0" err="1">
+                <a:latin typeface="Calibri" panose="020F0502020204030204" pitchFamily="34" charset="0"/>
+                <a:ea typeface="新細明體" panose="02020500000000000000" pitchFamily="18" charset="-120"/>
+                <a:cs typeface="Times New Roman" panose="02020603050405020304" pitchFamily="18" charset="0"/>
+              </a:rPr>
+              <a:t>Kernel.</a:t>
+            </a:r>
+            <a:r>
+              <a:rPr lang="en-US" altLang="zh-TW" sz="1400" kern="1200" dirty="0" err="1">
+                <a:effectLst/>
+                <a:latin typeface="Calibri" panose="020F0502020204030204" pitchFamily="34" charset="0"/>
+                <a:ea typeface="新細明體" panose="02020500000000000000" pitchFamily="18" charset="-120"/>
+                <a:cs typeface="Times New Roman" panose="02020603050405020304" pitchFamily="18" charset="0"/>
+              </a:rPr>
+              <a:t>end_x</a:t>
+            </a:r>
+            <a:endParaRPr lang="en-US" altLang="zh-TW" sz="1400" dirty="0">
+              <a:latin typeface="Calibri" panose="020F0502020204030204" pitchFamily="34" charset="0"/>
+              <a:ea typeface="新細明體" panose="02020500000000000000" pitchFamily="18" charset="-120"/>
+              <a:cs typeface="Times New Roman" panose="02020603050405020304" pitchFamily="18" charset="0"/>
+            </a:endParaRPr>
+          </a:p>
+          <a:p>
+            <a:r>
+              <a:rPr lang="en-US" altLang="zh-TW" sz="1400" kern="1200" dirty="0" err="1">
+                <a:effectLst/>
+                <a:latin typeface="Calibri" panose="020F0502020204030204" pitchFamily="34" charset="0"/>
+                <a:ea typeface="新細明體" panose="02020500000000000000" pitchFamily="18" charset="-120"/>
+                <a:cs typeface="Times New Roman" panose="02020603050405020304" pitchFamily="18" charset="0"/>
+              </a:rPr>
+              <a:t>Kernel.end_y</a:t>
+            </a:r>
+            <a:endParaRPr lang="en-US" altLang="zh-TW" sz="1400" kern="1200" dirty="0">
+              <a:effectLst/>
+              <a:latin typeface="Calibri" panose="020F0502020204030204" pitchFamily="34" charset="0"/>
+              <a:ea typeface="新細明體" panose="02020500000000000000" pitchFamily="18" charset="-120"/>
+              <a:cs typeface="Times New Roman" panose="02020603050405020304" pitchFamily="18" charset="0"/>
+            </a:endParaRPr>
+          </a:p>
+          <a:p>
+            <a:r>
+              <a:rPr lang="en-US" altLang="zh-TW" sz="1400" dirty="0">
+                <a:latin typeface="Calibri" panose="020F0502020204030204" pitchFamily="34" charset="0"/>
+                <a:ea typeface="新細明體" panose="02020500000000000000" pitchFamily="18" charset="-120"/>
+                <a:cs typeface="Times New Roman" panose="02020603050405020304" pitchFamily="18" charset="0"/>
+              </a:rPr>
+              <a:t>Threshold</a:t>
+            </a:r>
+            <a:endParaRPr lang="zh-TW" altLang="en-US" sz="1400" dirty="0"/>
+          </a:p>
+        </p:txBody>
+      </p:sp>
+      <p:cxnSp>
+        <p:nvCxnSpPr>
+          <p:cNvPr id="164" name="Straight Arrow Connector 163">
+            <a:extLst>
+              <a:ext uri="{FF2B5EF4-FFF2-40B4-BE49-F238E27FC236}">
+                <a16:creationId xmlns:a16="http://schemas.microsoft.com/office/drawing/2014/main" id="{0EA07DD1-9CD1-4249-BB34-67FA82E167DF}"/>
+              </a:ext>
+            </a:extLst>
+          </p:cNvPr>
+          <p:cNvCxnSpPr>
+            <a:cxnSpLocks/>
+          </p:cNvCxnSpPr>
+          <p:nvPr/>
+        </p:nvCxnSpPr>
+        <p:spPr>
+          <a:xfrm flipH="1">
+            <a:off x="4686881" y="4989696"/>
+            <a:ext cx="494719" cy="0"/>
+          </a:xfrm>
+          <a:prstGeom prst="straightConnector1">
+            <a:avLst/>
+          </a:prstGeom>
+          <a:ln w="57150">
+            <a:solidFill>
+              <a:srgbClr val="FF0000"/>
+            </a:solidFill>
+            <a:tailEnd type="triangle"/>
+          </a:ln>
+        </p:spPr>
+        <p:style>
+          <a:lnRef idx="1">
+            <a:schemeClr val="accent1"/>
+          </a:lnRef>
+          <a:fillRef idx="0">
+            <a:schemeClr val="accent1"/>
+          </a:fillRef>
+          <a:effectRef idx="0">
+            <a:schemeClr val="accent1"/>
+          </a:effectRef>
+          <a:fontRef idx="minor">
+            <a:schemeClr val="tx1"/>
+          </a:fontRef>
+        </p:style>
+      </p:cxnSp>
+      <p:sp>
+        <p:nvSpPr>
+          <p:cNvPr id="165" name="TextBox 164">
+            <a:extLst>
+              <a:ext uri="{FF2B5EF4-FFF2-40B4-BE49-F238E27FC236}">
+                <a16:creationId xmlns:a16="http://schemas.microsoft.com/office/drawing/2014/main" id="{AB1C0466-B62C-44E9-967D-B66F6EEC2077}"/>
+              </a:ext>
+            </a:extLst>
+          </p:cNvPr>
+          <p:cNvSpPr txBox="1"/>
+          <p:nvPr/>
+        </p:nvSpPr>
+        <p:spPr>
+          <a:xfrm>
+            <a:off x="5181600" y="4819750"/>
+            <a:ext cx="1788321" cy="307777"/>
+          </a:xfrm>
+          <a:prstGeom prst="rect">
+            <a:avLst/>
+          </a:prstGeom>
+          <a:noFill/>
+        </p:spPr>
+        <p:txBody>
+          <a:bodyPr wrap="square">
+            <a:spAutoFit/>
+          </a:bodyPr>
+          <a:lstStyle/>
+          <a:p>
+            <a:r>
+              <a:rPr lang="en-US" altLang="zh-TW" sz="1400" kern="1200" dirty="0">
+                <a:effectLst/>
+                <a:latin typeface="Calibri" panose="020F0502020204030204" pitchFamily="34" charset="0"/>
+                <a:ea typeface="新細明體" panose="02020500000000000000" pitchFamily="18" charset="-120"/>
+                <a:cs typeface="Times New Roman" panose="02020603050405020304" pitchFamily="18" charset="0"/>
+              </a:rPr>
+              <a:t>N</a:t>
+            </a:r>
+            <a:endParaRPr lang="zh-TW" altLang="en-US" sz="1400" dirty="0"/>
+          </a:p>
+        </p:txBody>
+      </p:sp>
+      <p:cxnSp>
+        <p:nvCxnSpPr>
+          <p:cNvPr id="166" name="Straight Arrow Connector 165">
+            <a:extLst>
+              <a:ext uri="{FF2B5EF4-FFF2-40B4-BE49-F238E27FC236}">
+                <a16:creationId xmlns:a16="http://schemas.microsoft.com/office/drawing/2014/main" id="{696781C8-E9B0-4165-85B2-CD3012E03266}"/>
+              </a:ext>
+            </a:extLst>
+          </p:cNvPr>
+          <p:cNvCxnSpPr>
+            <a:cxnSpLocks/>
+            <a:endCxn id="52" idx="3"/>
+          </p:cNvCxnSpPr>
+          <p:nvPr/>
+        </p:nvCxnSpPr>
+        <p:spPr>
+          <a:xfrm flipH="1">
+            <a:off x="4686883" y="4166824"/>
+            <a:ext cx="494717" cy="0"/>
+          </a:xfrm>
+          <a:prstGeom prst="straightConnector1">
+            <a:avLst/>
+          </a:prstGeom>
+          <a:ln w="57150">
+            <a:solidFill>
+              <a:srgbClr val="FF0000"/>
+            </a:solidFill>
+            <a:tailEnd type="triangle"/>
+          </a:ln>
+        </p:spPr>
+        <p:style>
+          <a:lnRef idx="1">
+            <a:schemeClr val="accent1"/>
+          </a:lnRef>
+          <a:fillRef idx="0">
+            <a:schemeClr val="accent1"/>
+          </a:fillRef>
+          <a:effectRef idx="0">
+            <a:schemeClr val="accent1"/>
+          </a:effectRef>
+          <a:fontRef idx="minor">
+            <a:schemeClr val="tx1"/>
+          </a:fontRef>
+        </p:style>
+      </p:cxnSp>
+      <p:sp>
+        <p:nvSpPr>
+          <p:cNvPr id="174" name="TextBox 173">
+            <a:extLst>
+              <a:ext uri="{FF2B5EF4-FFF2-40B4-BE49-F238E27FC236}">
+                <a16:creationId xmlns:a16="http://schemas.microsoft.com/office/drawing/2014/main" id="{CD7B2A1A-DD3B-4CF9-B90A-A9CD2BD08182}"/>
+              </a:ext>
+            </a:extLst>
+          </p:cNvPr>
+          <p:cNvSpPr txBox="1"/>
+          <p:nvPr/>
+        </p:nvSpPr>
+        <p:spPr>
+          <a:xfrm>
+            <a:off x="5181600" y="4003711"/>
+            <a:ext cx="773893" cy="307777"/>
+          </a:xfrm>
+          <a:prstGeom prst="rect">
+            <a:avLst/>
+          </a:prstGeom>
+          <a:noFill/>
+        </p:spPr>
+        <p:txBody>
+          <a:bodyPr wrap="square">
+            <a:spAutoFit/>
+          </a:bodyPr>
+          <a:lstStyle/>
+          <a:p>
+            <a:r>
+              <a:rPr lang="en-US" altLang="zh-TW" sz="1400" dirty="0"/>
+              <a:t>radius</a:t>
+            </a:r>
+            <a:endParaRPr lang="zh-TW" altLang="en-US" sz="1400" dirty="0"/>
+          </a:p>
+        </p:txBody>
+      </p:sp>
+      <p:cxnSp>
+        <p:nvCxnSpPr>
+          <p:cNvPr id="178" name="Straight Arrow Connector 177">
+            <a:extLst>
+              <a:ext uri="{FF2B5EF4-FFF2-40B4-BE49-F238E27FC236}">
+                <a16:creationId xmlns:a16="http://schemas.microsoft.com/office/drawing/2014/main" id="{7F46ECC0-CFF8-40C5-A4E8-B56D1ED494E5}"/>
+              </a:ext>
+            </a:extLst>
+          </p:cNvPr>
+          <p:cNvCxnSpPr>
+            <a:cxnSpLocks/>
+            <a:stCxn id="83" idx="3"/>
+            <a:endCxn id="117" idx="1"/>
+          </p:cNvCxnSpPr>
+          <p:nvPr/>
+        </p:nvCxnSpPr>
+        <p:spPr>
+          <a:xfrm>
+            <a:off x="4612531" y="2408798"/>
+            <a:ext cx="3124677" cy="0"/>
+          </a:xfrm>
+          <a:prstGeom prst="straightConnector1">
+            <a:avLst/>
+          </a:prstGeom>
+          <a:ln w="38100">
+            <a:solidFill>
+              <a:srgbClr val="0070C0"/>
+            </a:solidFill>
+            <a:tailEnd type="triangle"/>
+          </a:ln>
+        </p:spPr>
+        <p:style>
+          <a:lnRef idx="1">
+            <a:schemeClr val="accent1"/>
+          </a:lnRef>
+          <a:fillRef idx="0">
+            <a:schemeClr val="accent1"/>
+          </a:fillRef>
+          <a:effectRef idx="0">
+            <a:schemeClr val="accent1"/>
+          </a:effectRef>
+          <a:fontRef idx="minor">
+            <a:schemeClr val="tx1"/>
+          </a:fontRef>
+        </p:style>
+      </p:cxnSp>
+      <p:grpSp>
+        <p:nvGrpSpPr>
+          <p:cNvPr id="190" name="Group 189">
+            <a:extLst>
+              <a:ext uri="{FF2B5EF4-FFF2-40B4-BE49-F238E27FC236}">
+                <a16:creationId xmlns:a16="http://schemas.microsoft.com/office/drawing/2014/main" id="{C47030C6-9932-458D-8250-324BFD089C75}"/>
+              </a:ext>
+            </a:extLst>
+          </p:cNvPr>
+          <p:cNvGrpSpPr/>
+          <p:nvPr/>
+        </p:nvGrpSpPr>
+        <p:grpSpPr>
+          <a:xfrm>
+            <a:off x="5965044" y="3453174"/>
+            <a:ext cx="1045080" cy="322200"/>
+            <a:chOff x="6158541" y="3522988"/>
+            <a:chExt cx="1045080" cy="322200"/>
+          </a:xfrm>
+        </p:grpSpPr>
+        <mc:AlternateContent xmlns:mc="http://schemas.openxmlformats.org/markup-compatibility/2006">
+          <mc:Choice xmlns:p14="http://schemas.microsoft.com/office/powerpoint/2010/main" Requires="p14">
+            <p:contentPart p14:bwMode="auto" r:id="rId2">
+              <p14:nvContentPartPr>
+                <p14:cNvPr id="188" name="Ink 187">
+                  <a:extLst>
+                    <a:ext uri="{FF2B5EF4-FFF2-40B4-BE49-F238E27FC236}">
+                      <a16:creationId xmlns:a16="http://schemas.microsoft.com/office/drawing/2014/main" id="{84B4AA2F-275E-4E82-8CC3-400FE065A2DA}"/>
+                    </a:ext>
+                  </a:extLst>
+                </p14:cNvPr>
+                <p14:cNvContentPartPr/>
+                <p14:nvPr/>
+              </p14:nvContentPartPr>
+              <p14:xfrm>
+                <a:off x="6158541" y="3522988"/>
+                <a:ext cx="999360" cy="191880"/>
+              </p14:xfrm>
+            </p:contentPart>
+          </mc:Choice>
+          <mc:Fallback>
+            <p:pic>
+              <p:nvPicPr>
+                <p:cNvPr id="188" name="Ink 187">
+                  <a:extLst>
+                    <a:ext uri="{FF2B5EF4-FFF2-40B4-BE49-F238E27FC236}">
+                      <a16:creationId xmlns:a16="http://schemas.microsoft.com/office/drawing/2014/main" id="{84B4AA2F-275E-4E82-8CC3-400FE065A2DA}"/>
+                    </a:ext>
+                  </a:extLst>
+                </p:cNvPr>
+                <p:cNvPicPr/>
+                <p:nvPr/>
+              </p:nvPicPr>
+              <p:blipFill>
+                <a:blip r:embed="rId3"/>
+                <a:stretch>
+                  <a:fillRect/>
+                </a:stretch>
+              </p:blipFill>
+              <p:spPr>
+                <a:xfrm>
+                  <a:off x="6140901" y="3505348"/>
+                  <a:ext cx="1035000" cy="227520"/>
+                </a:xfrm>
+                <a:prstGeom prst="rect">
+                  <a:avLst/>
+                </a:prstGeom>
+              </p:spPr>
+            </p:pic>
+          </mc:Fallback>
+        </mc:AlternateContent>
+        <mc:AlternateContent xmlns:mc="http://schemas.openxmlformats.org/markup-compatibility/2006">
+          <mc:Choice xmlns:p14="http://schemas.microsoft.com/office/powerpoint/2010/main" Requires="p14">
+            <p:contentPart p14:bwMode="auto" r:id="rId4">
+              <p14:nvContentPartPr>
+                <p14:cNvPr id="189" name="Ink 188">
+                  <a:extLst>
+                    <a:ext uri="{FF2B5EF4-FFF2-40B4-BE49-F238E27FC236}">
+                      <a16:creationId xmlns:a16="http://schemas.microsoft.com/office/drawing/2014/main" id="{C579CBBF-005C-4EBC-A9D7-BA217B4D27F3}"/>
+                    </a:ext>
+                  </a:extLst>
+                </p14:cNvPr>
+                <p14:cNvContentPartPr/>
+                <p14:nvPr/>
+              </p14:nvContentPartPr>
+              <p14:xfrm>
+                <a:off x="6962061" y="3567988"/>
+                <a:ext cx="241560" cy="277200"/>
+              </p14:xfrm>
+            </p:contentPart>
+          </mc:Choice>
+          <mc:Fallback>
+            <p:pic>
+              <p:nvPicPr>
+                <p:cNvPr id="189" name="Ink 188">
+                  <a:extLst>
+                    <a:ext uri="{FF2B5EF4-FFF2-40B4-BE49-F238E27FC236}">
+                      <a16:creationId xmlns:a16="http://schemas.microsoft.com/office/drawing/2014/main" id="{C579CBBF-005C-4EBC-A9D7-BA217B4D27F3}"/>
+                    </a:ext>
+                  </a:extLst>
+                </p:cNvPr>
+                <p:cNvPicPr/>
+                <p:nvPr/>
+              </p:nvPicPr>
+              <p:blipFill>
+                <a:blip r:embed="rId5"/>
+                <a:stretch>
+                  <a:fillRect/>
+                </a:stretch>
+              </p:blipFill>
+              <p:spPr>
+                <a:xfrm>
+                  <a:off x="6944061" y="3549988"/>
+                  <a:ext cx="277200" cy="312840"/>
+                </a:xfrm>
+                <a:prstGeom prst="rect">
+                  <a:avLst/>
+                </a:prstGeom>
+              </p:spPr>
+            </p:pic>
+          </mc:Fallback>
+        </mc:AlternateContent>
+      </p:grpSp>
+      <p:sp>
+        <p:nvSpPr>
+          <p:cNvPr id="191" name="TextBox 190">
+            <a:extLst>
+              <a:ext uri="{FF2B5EF4-FFF2-40B4-BE49-F238E27FC236}">
+                <a16:creationId xmlns:a16="http://schemas.microsoft.com/office/drawing/2014/main" id="{D69A194D-3738-4382-B6DF-614FD963D7E8}"/>
+              </a:ext>
+            </a:extLst>
+          </p:cNvPr>
+          <p:cNvSpPr txBox="1"/>
+          <p:nvPr/>
+        </p:nvSpPr>
+        <p:spPr>
+          <a:xfrm>
+            <a:off x="7050525" y="3490972"/>
+            <a:ext cx="2714321" cy="523220"/>
+          </a:xfrm>
+          <a:prstGeom prst="rect">
+            <a:avLst/>
+          </a:prstGeom>
+          <a:noFill/>
+        </p:spPr>
+        <p:txBody>
+          <a:bodyPr wrap="square" rtlCol="0">
+            <a:spAutoFit/>
+          </a:bodyPr>
+          <a:lstStyle/>
+          <a:p>
+            <a:r>
+              <a:rPr lang="en-US" altLang="zh-TW" sz="1400" dirty="0"/>
+              <a:t>After getting the first LBP, move to surrounding kernel (BFS)</a:t>
+            </a:r>
+            <a:endParaRPr lang="zh-TW" altLang="en-US" sz="1400" dirty="0"/>
+          </a:p>
+        </p:txBody>
+      </p:sp>
+      <p:sp>
+        <p:nvSpPr>
+          <p:cNvPr id="195" name="TextBox 194">
+            <a:extLst>
+              <a:ext uri="{FF2B5EF4-FFF2-40B4-BE49-F238E27FC236}">
+                <a16:creationId xmlns:a16="http://schemas.microsoft.com/office/drawing/2014/main" id="{1E678C31-B890-4640-BF35-1502B7C7D174}"/>
+              </a:ext>
+            </a:extLst>
+          </p:cNvPr>
+          <p:cNvSpPr txBox="1"/>
+          <p:nvPr/>
+        </p:nvSpPr>
+        <p:spPr>
+          <a:xfrm>
+            <a:off x="5047963" y="2089693"/>
+            <a:ext cx="2096071" cy="307777"/>
+          </a:xfrm>
+          <a:prstGeom prst="rect">
+            <a:avLst/>
+          </a:prstGeom>
+          <a:noFill/>
+        </p:spPr>
+        <p:txBody>
+          <a:bodyPr wrap="square">
+            <a:spAutoFit/>
+          </a:bodyPr>
+          <a:lstStyle/>
+          <a:p>
+            <a:pPr algn="ctr"/>
+            <a:r>
+              <a:rPr lang="en-US" altLang="zh-TW" sz="1400" dirty="0"/>
+              <a:t>Image Result Mask[L,W]</a:t>
+            </a:r>
+            <a:endParaRPr lang="zh-TW" altLang="en-US" sz="1400" dirty="0"/>
+          </a:p>
+        </p:txBody>
+      </p:sp>
+      <p:grpSp>
+        <p:nvGrpSpPr>
+          <p:cNvPr id="196" name="Group 195">
+            <a:extLst>
+              <a:ext uri="{FF2B5EF4-FFF2-40B4-BE49-F238E27FC236}">
+                <a16:creationId xmlns:a16="http://schemas.microsoft.com/office/drawing/2014/main" id="{5DD34427-39A7-4D27-988B-04E3E548BA13}"/>
+              </a:ext>
+            </a:extLst>
+          </p:cNvPr>
+          <p:cNvGrpSpPr/>
+          <p:nvPr/>
+        </p:nvGrpSpPr>
+        <p:grpSpPr>
+          <a:xfrm rot="20481870">
+            <a:off x="4598436" y="1740547"/>
+            <a:ext cx="2488952" cy="322200"/>
+            <a:chOff x="6158541" y="3522988"/>
+            <a:chExt cx="1045080" cy="322200"/>
+          </a:xfrm>
+        </p:grpSpPr>
+        <mc:AlternateContent xmlns:mc="http://schemas.openxmlformats.org/markup-compatibility/2006">
+          <mc:Choice xmlns:p14="http://schemas.microsoft.com/office/powerpoint/2010/main" Requires="p14">
+            <p:contentPart p14:bwMode="auto" r:id="rId6">
+              <p14:nvContentPartPr>
+                <p14:cNvPr id="197" name="Ink 196">
+                  <a:extLst>
+                    <a:ext uri="{FF2B5EF4-FFF2-40B4-BE49-F238E27FC236}">
+                      <a16:creationId xmlns:a16="http://schemas.microsoft.com/office/drawing/2014/main" id="{19774CE7-FC41-4505-BDEF-CF03387FE82E}"/>
+                    </a:ext>
+                  </a:extLst>
+                </p14:cNvPr>
+                <p14:cNvContentPartPr/>
+                <p14:nvPr/>
+              </p14:nvContentPartPr>
+              <p14:xfrm>
+                <a:off x="6158541" y="3522988"/>
+                <a:ext cx="999360" cy="191880"/>
+              </p14:xfrm>
+            </p:contentPart>
+          </mc:Choice>
+          <mc:Fallback>
+            <p:pic>
+              <p:nvPicPr>
+                <p:cNvPr id="197" name="Ink 196">
+                  <a:extLst>
+                    <a:ext uri="{FF2B5EF4-FFF2-40B4-BE49-F238E27FC236}">
+                      <a16:creationId xmlns:a16="http://schemas.microsoft.com/office/drawing/2014/main" id="{19774CE7-FC41-4505-BDEF-CF03387FE82E}"/>
+                    </a:ext>
+                  </a:extLst>
+                </p:cNvPr>
+                <p:cNvPicPr/>
+                <p:nvPr/>
+              </p:nvPicPr>
+              <p:blipFill>
+                <a:blip r:embed="rId7"/>
+                <a:stretch>
+                  <a:fillRect/>
+                </a:stretch>
+              </p:blipFill>
+              <p:spPr>
+                <a:xfrm>
+                  <a:off x="6151132" y="3505348"/>
+                  <a:ext cx="1014330" cy="227520"/>
+                </a:xfrm>
+                <a:prstGeom prst="rect">
+                  <a:avLst/>
+                </a:prstGeom>
+              </p:spPr>
+            </p:pic>
+          </mc:Fallback>
+        </mc:AlternateContent>
+        <mc:AlternateContent xmlns:mc="http://schemas.openxmlformats.org/markup-compatibility/2006">
+          <mc:Choice xmlns:p14="http://schemas.microsoft.com/office/powerpoint/2010/main" Requires="p14">
+            <p:contentPart p14:bwMode="auto" r:id="rId8">
+              <p14:nvContentPartPr>
+                <p14:cNvPr id="198" name="Ink 197">
+                  <a:extLst>
+                    <a:ext uri="{FF2B5EF4-FFF2-40B4-BE49-F238E27FC236}">
+                      <a16:creationId xmlns:a16="http://schemas.microsoft.com/office/drawing/2014/main" id="{575A7525-4B44-4D56-A59D-4E47EB014CA6}"/>
+                    </a:ext>
+                  </a:extLst>
+                </p14:cNvPr>
+                <p14:cNvContentPartPr/>
+                <p14:nvPr/>
+              </p14:nvContentPartPr>
+              <p14:xfrm>
+                <a:off x="6962061" y="3567988"/>
+                <a:ext cx="241560" cy="277200"/>
+              </p14:xfrm>
+            </p:contentPart>
+          </mc:Choice>
+          <mc:Fallback>
+            <p:pic>
+              <p:nvPicPr>
+                <p:cNvPr id="198" name="Ink 197">
+                  <a:extLst>
+                    <a:ext uri="{FF2B5EF4-FFF2-40B4-BE49-F238E27FC236}">
+                      <a16:creationId xmlns:a16="http://schemas.microsoft.com/office/drawing/2014/main" id="{575A7525-4B44-4D56-A59D-4E47EB014CA6}"/>
+                    </a:ext>
+                  </a:extLst>
+                </p:cNvPr>
+                <p:cNvPicPr/>
+                <p:nvPr/>
+              </p:nvPicPr>
+              <p:blipFill>
+                <a:blip r:embed="rId9"/>
+                <a:stretch>
+                  <a:fillRect/>
+                </a:stretch>
+              </p:blipFill>
+              <p:spPr>
+                <a:xfrm>
+                  <a:off x="6954498" y="3549988"/>
+                  <a:ext cx="256535" cy="312840"/>
+                </a:xfrm>
+                <a:prstGeom prst="rect">
+                  <a:avLst/>
+                </a:prstGeom>
+              </p:spPr>
+            </p:pic>
+          </mc:Fallback>
+        </mc:AlternateContent>
+      </p:grpSp>
+      <p:sp>
+        <p:nvSpPr>
+          <p:cNvPr id="199" name="TextBox 198">
+            <a:extLst>
+              <a:ext uri="{FF2B5EF4-FFF2-40B4-BE49-F238E27FC236}">
+                <a16:creationId xmlns:a16="http://schemas.microsoft.com/office/drawing/2014/main" id="{3A5B097F-0C17-4B6E-A18D-B2731CB98B8C}"/>
+              </a:ext>
+            </a:extLst>
+          </p:cNvPr>
+          <p:cNvSpPr txBox="1"/>
+          <p:nvPr/>
+        </p:nvSpPr>
+        <p:spPr>
+          <a:xfrm>
+            <a:off x="7147128" y="1232951"/>
+            <a:ext cx="3358641" cy="523220"/>
+          </a:xfrm>
+          <a:prstGeom prst="rect">
+            <a:avLst/>
+          </a:prstGeom>
+          <a:noFill/>
+        </p:spPr>
+        <p:txBody>
+          <a:bodyPr wrap="square" rtlCol="0">
+            <a:spAutoFit/>
+          </a:bodyPr>
+          <a:lstStyle/>
+          <a:p>
+            <a:r>
+              <a:rPr lang="en-US" altLang="zh-TW" sz="1400" dirty="0"/>
+              <a:t>Using u16 </a:t>
+            </a:r>
+            <a:r>
+              <a:rPr lang="en-US" altLang="zh-TW" sz="1400" dirty="0" err="1"/>
+              <a:t>bitshift</a:t>
+            </a:r>
+            <a:r>
+              <a:rPr lang="en-US" altLang="zh-TW" sz="1400" dirty="0"/>
+              <a:t> left OR 1 or 0 to detect whether ALL adjacent kernels in NOT a road</a:t>
+            </a:r>
+            <a:endParaRPr lang="zh-TW" altLang="en-US" sz="1400" dirty="0"/>
           </a:p>
         </p:txBody>
       </p:sp>
@@ -8400,126 +10189,175 @@
         </p:nvSpPr>
         <p:spPr>
           <a:xfrm>
-            <a:off x="838200" y="1009837"/>
-            <a:ext cx="10515600" cy="4351338"/>
-          </a:xfrm>
-        </p:spPr>
-        <p:txBody>
-          <a:bodyPr/>
-          <a:lstStyle/>
-          <a:p>
-            <a:r>
-              <a:rPr lang="en-US" altLang="zh-TW" dirty="0" err="1"/>
+            <a:off x="251012" y="1009837"/>
+            <a:ext cx="11689976" cy="4351338"/>
+          </a:xfrm>
+        </p:spPr>
+        <p:txBody>
+          <a:bodyPr>
+            <a:normAutofit/>
+          </a:bodyPr>
+          <a:lstStyle/>
+          <a:p>
+            <a:pPr marL="0" indent="0">
+              <a:buNone/>
+            </a:pPr>
+            <a:r>
+              <a:rPr lang="en-US" altLang="zh-TW" sz="1800" dirty="0" err="1"/>
+              <a:t>Gray_img</a:t>
+            </a:r>
+            <a:r>
+              <a:rPr lang="en-US" altLang="zh-TW" sz="1800" dirty="0"/>
+              <a:t> = Grayscale(</a:t>
+            </a:r>
+            <a:r>
+              <a:rPr lang="en-US" altLang="zh-TW" sz="1800" dirty="0" err="1"/>
+              <a:t>Source_img</a:t>
+            </a:r>
+            <a:r>
+              <a:rPr lang="en-US" altLang="zh-TW" sz="1800" dirty="0"/>
+              <a:t>)</a:t>
+            </a:r>
+          </a:p>
+          <a:p>
+            <a:pPr marL="0" indent="0">
+              <a:buNone/>
+            </a:pPr>
+            <a:r>
+              <a:rPr lang="en-US" altLang="zh-TW" sz="1800" dirty="0" err="1"/>
+              <a:t>Sobel_img</a:t>
+            </a:r>
+            <a:r>
+              <a:rPr lang="en-US" altLang="zh-TW" sz="1800" dirty="0"/>
+              <a:t> = Sobel(</a:t>
+            </a:r>
+            <a:r>
+              <a:rPr lang="en-US" altLang="zh-TW" sz="1800" dirty="0" err="1"/>
+              <a:t>Gray_img</a:t>
+            </a:r>
+            <a:r>
+              <a:rPr lang="en-US" altLang="zh-TW" sz="1800" dirty="0"/>
+              <a:t>, </a:t>
+            </a:r>
+            <a:r>
+              <a:rPr lang="en-US" altLang="zh-TW" sz="1800" dirty="0" err="1"/>
+              <a:t>Sobel_kernel_size</a:t>
+            </a:r>
+            <a:r>
+              <a:rPr lang="en-US" altLang="zh-TW" sz="1800" dirty="0"/>
+              <a:t>)</a:t>
+            </a:r>
+          </a:p>
+          <a:p>
+            <a:pPr marL="0" indent="0">
+              <a:buNone/>
+            </a:pPr>
+            <a:r>
+              <a:rPr lang="en-US" altLang="zh-TW" sz="1800" dirty="0"/>
+              <a:t>bool[n] </a:t>
+            </a:r>
+            <a:r>
+              <a:rPr lang="en-US" altLang="zh-TW" sz="1800" dirty="0" err="1"/>
+              <a:t>is_road_array</a:t>
+            </a:r>
+            <a:endParaRPr lang="en-US" altLang="zh-TW" sz="1800" dirty="0"/>
+          </a:p>
+          <a:p>
+            <a:pPr marL="0" indent="0">
+              <a:buNone/>
+            </a:pPr>
+            <a:r>
+              <a:rPr lang="en-US" altLang="zh-TW" sz="1800" dirty="0" err="1"/>
+              <a:t>center_x</a:t>
+            </a:r>
+            <a:r>
+              <a:rPr lang="en-US" altLang="zh-TW" sz="1800" dirty="0"/>
+              <a:t>, </a:t>
+            </a:r>
+            <a:r>
+              <a:rPr lang="en-US" altLang="zh-TW" sz="1800" dirty="0" err="1"/>
+              <a:t>center_y</a:t>
+            </a:r>
+            <a:r>
+              <a:rPr lang="en-US" altLang="zh-TW" sz="1800" dirty="0"/>
+              <a:t>  // Kernel center point coordinate)</a:t>
+            </a:r>
+          </a:p>
+          <a:p>
+            <a:pPr marL="0" indent="0">
+              <a:buNone/>
+            </a:pPr>
+            <a:r>
+              <a:rPr lang="en-US" altLang="zh-TW" sz="1800" dirty="0"/>
+              <a:t>While (</a:t>
+            </a:r>
+            <a:r>
+              <a:rPr lang="en-US" altLang="zh-TW" sz="1800" dirty="0" err="1"/>
+              <a:t>is_road_array</a:t>
+            </a:r>
+            <a:r>
+              <a:rPr lang="en-US" altLang="zh-TW" sz="1800" dirty="0"/>
+              <a:t> mapped to u16) is True:</a:t>
+            </a:r>
+          </a:p>
+          <a:p>
+            <a:pPr marL="0" indent="0">
+              <a:buNone/>
+            </a:pPr>
+            <a:r>
+              <a:rPr lang="en-US" altLang="zh-TW" sz="1800" dirty="0"/>
+              <a:t>	kernel = </a:t>
+            </a:r>
+            <a:r>
+              <a:rPr lang="en-US" altLang="zh-TW" sz="1800" dirty="0" err="1"/>
               <a:t>Get_kernel</a:t>
             </a:r>
-            <a:endParaRPr lang="en-US" altLang="zh-TW" dirty="0"/>
-          </a:p>
-          <a:p>
-            <a:pPr lvl="1"/>
-            <a:r>
-              <a:rPr lang="en-US" altLang="zh-TW" dirty="0"/>
-              <a:t>Input: (u8 array) </a:t>
-            </a:r>
-            <a:r>
-              <a:rPr lang="en-US" altLang="zh-TW" dirty="0" err="1"/>
-              <a:t>Sobel_Image</a:t>
-            </a:r>
-            <a:endParaRPr lang="en-US" altLang="zh-TW" dirty="0"/>
-          </a:p>
-          <a:p>
-            <a:pPr lvl="1"/>
-            <a:r>
-              <a:rPr lang="en-US" altLang="zh-TW" dirty="0"/>
-              <a:t>Output: (u8 array[</a:t>
-            </a:r>
-            <a:r>
-              <a:rPr lang="en-US" altLang="zh-TW" dirty="0" err="1"/>
-              <a:t>k,k</a:t>
-            </a:r>
-            <a:r>
-              <a:rPr lang="en-US" altLang="zh-TW" dirty="0"/>
-              <a:t>]) </a:t>
-            </a:r>
-            <a:r>
-              <a:rPr lang="en-US" altLang="zh-TW" dirty="0" err="1"/>
-              <a:t>Kernel_Array</a:t>
-            </a:r>
-            <a:endParaRPr lang="en-US" altLang="zh-TW" dirty="0"/>
-          </a:p>
-          <a:p>
-            <a:pPr lvl="1"/>
-            <a:r>
-              <a:rPr lang="en-US" altLang="zh-TW" dirty="0"/>
-              <a:t>Parameters: (u8) Kernel Size (k), (u8) Kernel Center[X,Y] (c[2])</a:t>
-            </a:r>
-          </a:p>
-        </p:txBody>
-      </p:sp>
-      <p:sp>
-        <p:nvSpPr>
-          <p:cNvPr id="16" name="TextBox 15">
-            <a:extLst>
-              <a:ext uri="{FF2B5EF4-FFF2-40B4-BE49-F238E27FC236}">
-                <a16:creationId xmlns:a16="http://schemas.microsoft.com/office/drawing/2014/main" id="{48892B65-2F8B-4E53-807E-272D24ED76DB}"/>
-              </a:ext>
-            </a:extLst>
-          </p:cNvPr>
-          <p:cNvSpPr txBox="1"/>
-          <p:nvPr/>
-        </p:nvSpPr>
-        <p:spPr>
-          <a:xfrm>
-            <a:off x="1752600" y="3064237"/>
-            <a:ext cx="6096000" cy="369332"/>
-          </a:xfrm>
-          <a:prstGeom prst="rect">
-            <a:avLst/>
-          </a:prstGeom>
-          <a:noFill/>
-        </p:spPr>
-        <p:txBody>
-          <a:bodyPr wrap="square">
-            <a:spAutoFit/>
-          </a:bodyPr>
-          <a:lstStyle/>
-          <a:p>
-            <a:r>
-              <a:rPr lang="en-US" altLang="zh-TW" dirty="0"/>
-              <a:t>Pseudocode:</a:t>
-            </a:r>
-          </a:p>
-        </p:txBody>
-      </p:sp>
-      <p:pic>
-        <p:nvPicPr>
-          <p:cNvPr id="18" name="Picture 17">
-            <a:extLst>
-              <a:ext uri="{FF2B5EF4-FFF2-40B4-BE49-F238E27FC236}">
-                <a16:creationId xmlns:a16="http://schemas.microsoft.com/office/drawing/2014/main" id="{886A960A-2CBA-427B-8384-9162E47BB24D}"/>
-              </a:ext>
-            </a:extLst>
-          </p:cNvPr>
-          <p:cNvPicPr>
-            <a:picLocks noChangeAspect="1"/>
-          </p:cNvPicPr>
-          <p:nvPr/>
-        </p:nvPicPr>
-        <p:blipFill>
-          <a:blip r:embed="rId2"/>
-          <a:stretch>
-            <a:fillRect/>
-          </a:stretch>
-        </p:blipFill>
-        <p:spPr>
-          <a:xfrm>
-            <a:off x="1752600" y="3558988"/>
-            <a:ext cx="7607361" cy="1321487"/>
-          </a:xfrm>
-          <a:prstGeom prst="rect">
-            <a:avLst/>
-          </a:prstGeom>
-        </p:spPr>
-      </p:pic>
+            <a:r>
+              <a:rPr lang="en-US" altLang="zh-TW" sz="1800" dirty="0"/>
+              <a:t>(Sobel, k=</a:t>
+            </a:r>
+            <a:r>
+              <a:rPr lang="en-US" altLang="zh-TW" sz="1800" dirty="0" err="1"/>
+              <a:t>BFS_kernel_size</a:t>
+            </a:r>
+            <a:r>
+              <a:rPr lang="en-US" altLang="zh-TW" sz="1800" dirty="0"/>
+              <a:t>, c=[last index, middle index])</a:t>
+            </a:r>
+          </a:p>
+          <a:p>
+            <a:pPr marL="0" indent="0">
+              <a:buNone/>
+            </a:pPr>
+            <a:r>
+              <a:rPr lang="en-US" altLang="zh-TW" sz="1800" dirty="0"/>
+              <a:t>	</a:t>
+            </a:r>
+            <a:r>
+              <a:rPr lang="en-US" altLang="zh-TW" sz="1800" dirty="0" err="1"/>
+              <a:t>kernel_arr</a:t>
+            </a:r>
+            <a:r>
+              <a:rPr lang="en-US" altLang="zh-TW" sz="1800" dirty="0"/>
+              <a:t> = </a:t>
+            </a:r>
+            <a:r>
+              <a:rPr lang="en-US" altLang="zh-TW" sz="1800" dirty="0" err="1"/>
+              <a:t>kernel.Kernel_Array</a:t>
+            </a:r>
+            <a:endParaRPr lang="en-US" altLang="zh-TW" sz="1800" dirty="0"/>
+          </a:p>
+          <a:p>
+            <a:pPr marL="0" indent="0">
+              <a:buNone/>
+            </a:pPr>
+            <a:r>
+              <a:rPr lang="en-US" altLang="zh-TW" sz="1800" dirty="0"/>
+              <a:t>	</a:t>
+            </a:r>
+          </a:p>
+        </p:txBody>
+      </p:sp>
     </p:spTree>
     <p:extLst>
       <p:ext uri="{BB962C8B-B14F-4D97-AF65-F5344CB8AC3E}">
@@ -8602,8 +10440,8 @@
         </p:nvSpPr>
         <p:spPr>
           <a:xfrm>
-            <a:off x="838200" y="1066781"/>
-            <a:ext cx="10515600" cy="4351338"/>
+            <a:off x="251012" y="1009837"/>
+            <a:ext cx="11689976" cy="4351338"/>
           </a:xfrm>
         </p:spPr>
         <p:txBody>
@@ -8612,7 +10450,7 @@
           <a:p>
             <a:r>
               <a:rPr lang="en-US" altLang="zh-TW" dirty="0" err="1"/>
-              <a:t>Get_LBP</a:t>
+              <a:t>Get_kernel</a:t>
             </a:r>
             <a:endParaRPr lang="en-US" altLang="zh-TW" dirty="0"/>
           </a:p>
@@ -8620,7 +10458,26 @@
             <a:pPr lvl="1"/>
             <a:r>
               <a:rPr lang="en-US" altLang="zh-TW" dirty="0"/>
-              <a:t>Input: (u8 array[</a:t>
+              <a:t>Input: (u8 array) </a:t>
+            </a:r>
+            <a:r>
+              <a:rPr lang="en-US" altLang="zh-TW" dirty="0" err="1"/>
+              <a:t>Sobel_Image</a:t>
+            </a:r>
+            <a:endParaRPr lang="en-US" altLang="zh-TW" dirty="0"/>
+          </a:p>
+          <a:p>
+            <a:pPr lvl="1"/>
+            <a:r>
+              <a:rPr lang="en-US" altLang="zh-TW" dirty="0"/>
+              <a:t>Output: (Struct or Object) Kernel:</a:t>
+            </a:r>
+          </a:p>
+          <a:p>
+            <a:pPr lvl="2"/>
+            <a:r>
+              <a:rPr lang="en-US" altLang="zh-TW" dirty="0"/>
+              <a:t>(u8 array[</a:t>
             </a:r>
             <a:r>
               <a:rPr lang="en-US" altLang="zh-TW" dirty="0" err="1"/>
@@ -8637,36 +10494,68 @@
             <a:endParaRPr lang="en-US" altLang="zh-TW" dirty="0"/>
           </a:p>
           <a:p>
+            <a:pPr lvl="2"/>
+            <a:r>
+              <a:rPr lang="en-US" altLang="zh-TW" dirty="0"/>
+              <a:t>(u8) </a:t>
+            </a:r>
+            <a:r>
+              <a:rPr lang="en-US" altLang="zh-TW" dirty="0" err="1"/>
+              <a:t>start_x</a:t>
+            </a:r>
+            <a:endParaRPr lang="en-US" altLang="zh-TW" dirty="0"/>
+          </a:p>
+          <a:p>
+            <a:pPr lvl="2"/>
+            <a:r>
+              <a:rPr lang="en-US" altLang="zh-TW" dirty="0"/>
+              <a:t>(u8) </a:t>
+            </a:r>
+            <a:r>
+              <a:rPr lang="en-US" altLang="zh-TW" dirty="0" err="1"/>
+              <a:t>start_y</a:t>
+            </a:r>
+            <a:endParaRPr lang="en-US" altLang="zh-TW" dirty="0"/>
+          </a:p>
+          <a:p>
+            <a:pPr lvl="2"/>
+            <a:r>
+              <a:rPr lang="en-US" altLang="zh-TW" dirty="0"/>
+              <a:t>(u8) </a:t>
+            </a:r>
+            <a:r>
+              <a:rPr lang="en-US" altLang="zh-TW" dirty="0" err="1"/>
+              <a:t>end_x</a:t>
+            </a:r>
+            <a:endParaRPr lang="en-US" altLang="zh-TW" dirty="0"/>
+          </a:p>
+          <a:p>
+            <a:pPr lvl="2"/>
+            <a:r>
+              <a:rPr lang="en-US" altLang="zh-TW" dirty="0"/>
+              <a:t>(u8) </a:t>
+            </a:r>
+            <a:r>
+              <a:rPr lang="en-US" altLang="zh-TW" dirty="0" err="1"/>
+              <a:t>end_y</a:t>
+            </a:r>
+            <a:endParaRPr lang="en-US" altLang="zh-TW" dirty="0"/>
+          </a:p>
+          <a:p>
             <a:pPr lvl="1"/>
             <a:r>
               <a:rPr lang="en-US" altLang="zh-TW" dirty="0"/>
-              <a:t>Output: (u8 array[256]) </a:t>
-            </a:r>
-            <a:r>
-              <a:rPr lang="en-US" altLang="zh-TW" dirty="0" err="1"/>
-              <a:t>LBP_Histogram</a:t>
-            </a:r>
-            <a:endParaRPr lang="en-US" altLang="zh-TW" dirty="0"/>
-          </a:p>
-          <a:p>
-            <a:pPr lvl="1"/>
-            <a:r>
-              <a:rPr lang="en-US" altLang="zh-TW" dirty="0"/>
-              <a:t>Parameters: (u8) radius</a:t>
-            </a:r>
-          </a:p>
-          <a:p>
-            <a:pPr lvl="2"/>
-            <a:endParaRPr lang="en-US" altLang="zh-TW" dirty="0"/>
-          </a:p>
-        </p:txBody>
-      </p:sp>
-      <p:sp>
-        <p:nvSpPr>
-          <p:cNvPr id="6" name="TextBox 5">
-            <a:extLst>
-              <a:ext uri="{FF2B5EF4-FFF2-40B4-BE49-F238E27FC236}">
-                <a16:creationId xmlns:a16="http://schemas.microsoft.com/office/drawing/2014/main" id="{29F0A3BD-184B-45C7-8DB5-98E6D350FD77}"/>
+              <a:t>Parameters: (u8) Kernel Size (k), (u8) Kernel Center[X,Y] (c[2])</a:t>
+            </a:r>
+          </a:p>
+        </p:txBody>
+      </p:sp>
+      <p:sp>
+        <p:nvSpPr>
+          <p:cNvPr id="16" name="TextBox 15">
+            <a:extLst>
+              <a:ext uri="{FF2B5EF4-FFF2-40B4-BE49-F238E27FC236}">
+                <a16:creationId xmlns:a16="http://schemas.microsoft.com/office/drawing/2014/main" id="{48892B65-2F8B-4E53-807E-272D24ED76DB}"/>
               </a:ext>
             </a:extLst>
           </p:cNvPr>
@@ -8675,8 +10564,8 @@
         </p:nvSpPr>
         <p:spPr>
           <a:xfrm>
-            <a:off x="1264024" y="2919284"/>
-            <a:ext cx="7727576" cy="646331"/>
+            <a:off x="1752600" y="4536519"/>
+            <a:ext cx="6096000" cy="369332"/>
           </a:xfrm>
           <a:prstGeom prst="rect">
             <a:avLst/>
@@ -8694,17 +10583,14 @@
               <a:t>Pseudocode:</a:t>
             </a:r>
           </a:p>
-          <a:p>
-            <a:endParaRPr lang="en-US" altLang="zh-TW" dirty="0"/>
-          </a:p>
         </p:txBody>
       </p:sp>
       <p:pic>
         <p:nvPicPr>
-          <p:cNvPr id="9" name="Picture 8">
-            <a:extLst>
-              <a:ext uri="{FF2B5EF4-FFF2-40B4-BE49-F238E27FC236}">
-                <a16:creationId xmlns:a16="http://schemas.microsoft.com/office/drawing/2014/main" id="{9ADC238F-305C-49AC-9FF9-7E89AEF894AE}"/>
+          <p:cNvPr id="18" name="Picture 17">
+            <a:extLst>
+              <a:ext uri="{FF2B5EF4-FFF2-40B4-BE49-F238E27FC236}">
+                <a16:creationId xmlns:a16="http://schemas.microsoft.com/office/drawing/2014/main" id="{886A960A-2CBA-427B-8384-9162E47BB24D}"/>
               </a:ext>
             </a:extLst>
           </p:cNvPr>
@@ -8721,8 +10607,8 @@
         </p:blipFill>
         <p:spPr>
           <a:xfrm>
-            <a:off x="1264024" y="3242449"/>
-            <a:ext cx="5773270" cy="3506752"/>
+            <a:off x="1752600" y="5031270"/>
+            <a:ext cx="7607361" cy="1321487"/>
           </a:xfrm>
           <a:prstGeom prst="rect">
             <a:avLst/>
@@ -8732,7 +10618,7 @@
     </p:spTree>
     <p:extLst>
       <p:ext uri="{BB962C8B-B14F-4D97-AF65-F5344CB8AC3E}">
-        <p14:creationId xmlns:p14="http://schemas.microsoft.com/office/powerpoint/2010/main" val="2155432633"/>
+        <p14:creationId xmlns:p14="http://schemas.microsoft.com/office/powerpoint/2010/main" val="246661782"/>
       </p:ext>
     </p:extLst>
   </p:cSld>
@@ -8812,18 +10698,16 @@
         <p:spPr>
           <a:xfrm>
             <a:off x="838200" y="1066781"/>
-            <a:ext cx="10515600" cy="1992509"/>
-          </a:xfrm>
-        </p:spPr>
-        <p:txBody>
-          <a:bodyPr>
-            <a:normAutofit/>
-          </a:bodyPr>
+            <a:ext cx="10515600" cy="4351338"/>
+          </a:xfrm>
+        </p:spPr>
+        <p:txBody>
+          <a:bodyPr/>
           <a:lstStyle/>
           <a:p>
             <a:r>
               <a:rPr lang="en-US" altLang="zh-TW" dirty="0" err="1"/>
-              <a:t>Add_to_histogram</a:t>
+              <a:t>Get_LBP</a:t>
             </a:r>
             <a:endParaRPr lang="en-US" altLang="zh-TW" dirty="0"/>
           </a:p>
@@ -8831,19 +10715,19 @@
             <a:pPr lvl="1"/>
             <a:r>
               <a:rPr lang="en-US" altLang="zh-TW" dirty="0"/>
-              <a:t>Input: (u8) </a:t>
+              <a:t>Input: (u8 array[</a:t>
             </a:r>
             <a:r>
               <a:rPr lang="en-US" altLang="zh-TW" dirty="0" err="1"/>
-              <a:t>LBP_Value</a:t>
+              <a:t>k,k</a:t>
             </a:r>
             <a:r>
               <a:rPr lang="en-US" altLang="zh-TW" dirty="0"/>
-              <a:t>, (u8[256]) </a:t>
+              <a:t>]) </a:t>
             </a:r>
             <a:r>
               <a:rPr lang="en-US" altLang="zh-TW" dirty="0" err="1"/>
-              <a:t>LBP_Hist</a:t>
+              <a:t>Kernel_Array</a:t>
             </a:r>
             <a:endParaRPr lang="en-US" altLang="zh-TW" dirty="0"/>
           </a:p>
@@ -8851,15 +10735,24 @@
             <a:pPr lvl="1"/>
             <a:r>
               <a:rPr lang="en-US" altLang="zh-TW" dirty="0"/>
-              <a:t>Output: None</a:t>
-            </a:r>
+              <a:t>Output: (u8 array[256]) </a:t>
+            </a:r>
+            <a:r>
+              <a:rPr lang="en-US" altLang="zh-TW" dirty="0" err="1"/>
+              <a:t>LBP_Histogram</a:t>
+            </a:r>
+            <a:endParaRPr lang="en-US" altLang="zh-TW" dirty="0"/>
           </a:p>
           <a:p>
             <a:pPr lvl="1"/>
             <a:r>
               <a:rPr lang="en-US" altLang="zh-TW" dirty="0"/>
-              <a:t>Parameters: None</a:t>
-            </a:r>
+              <a:t>Parameters: (u8) radius</a:t>
+            </a:r>
+          </a:p>
+          <a:p>
+            <a:pPr lvl="2"/>
+            <a:endParaRPr lang="en-US" altLang="zh-TW" dirty="0"/>
           </a:p>
         </p:txBody>
       </p:sp>
@@ -8877,7 +10770,7 @@
         </p:nvSpPr>
         <p:spPr>
           <a:xfrm>
-            <a:off x="1264024" y="3059290"/>
+            <a:off x="1264024" y="2919284"/>
             <a:ext cx="7727576" cy="646331"/>
           </a:xfrm>
           <a:prstGeom prst="rect">
@@ -8903,10 +10796,10 @@
       </p:sp>
       <p:pic>
         <p:nvPicPr>
-          <p:cNvPr id="4" name="Picture 3">
-            <a:extLst>
-              <a:ext uri="{FF2B5EF4-FFF2-40B4-BE49-F238E27FC236}">
-                <a16:creationId xmlns:a16="http://schemas.microsoft.com/office/drawing/2014/main" id="{89464B99-7A84-4056-B6A9-7F8DCED72193}"/>
+          <p:cNvPr id="9" name="Picture 8">
+            <a:extLst>
+              <a:ext uri="{FF2B5EF4-FFF2-40B4-BE49-F238E27FC236}">
+                <a16:creationId xmlns:a16="http://schemas.microsoft.com/office/drawing/2014/main" id="{9ADC238F-305C-49AC-9FF9-7E89AEF894AE}"/>
               </a:ext>
             </a:extLst>
           </p:cNvPr>
@@ -8923,8 +10816,8 @@
         </p:blipFill>
         <p:spPr>
           <a:xfrm>
-            <a:off x="1264023" y="3476258"/>
-            <a:ext cx="8561755" cy="746117"/>
+            <a:off x="1264024" y="3242449"/>
+            <a:ext cx="5773270" cy="3506752"/>
           </a:xfrm>
           <a:prstGeom prst="rect">
             <a:avLst/>
@@ -8934,7 +10827,7 @@
     </p:spTree>
     <p:extLst>
       <p:ext uri="{BB962C8B-B14F-4D97-AF65-F5344CB8AC3E}">
-        <p14:creationId xmlns:p14="http://schemas.microsoft.com/office/powerpoint/2010/main" val="1281354304"/>
+        <p14:creationId xmlns:p14="http://schemas.microsoft.com/office/powerpoint/2010/main" val="2155432633"/>
       </p:ext>
     </p:extLst>
   </p:cSld>
@@ -8966,7 +10859,7 @@
           <p:cNvPr id="2" name="Title 1">
             <a:extLst>
               <a:ext uri="{FF2B5EF4-FFF2-40B4-BE49-F238E27FC236}">
-                <a16:creationId xmlns:a16="http://schemas.microsoft.com/office/drawing/2014/main" id="{7D72B325-C384-49D9-8DC2-D0535A68D0D1}"/>
+                <a16:creationId xmlns:a16="http://schemas.microsoft.com/office/drawing/2014/main" id="{E5D2891B-F272-4498-BEBE-DE4BC2C6506E}"/>
               </a:ext>
             </a:extLst>
           </p:cNvPr>
@@ -8977,21 +10870,30 @@
             <p:ph type="title"/>
           </p:nvPr>
         </p:nvSpPr>
-        <p:spPr/>
+        <p:spPr>
+          <a:xfrm>
+            <a:off x="838200" y="18255"/>
+            <a:ext cx="10515600" cy="1325563"/>
+          </a:xfrm>
+        </p:spPr>
         <p:txBody>
           <a:bodyPr/>
           <a:lstStyle/>
           <a:p>
-            <a:endParaRPr lang="zh-TW" altLang="en-US"/>
-          </a:p>
-        </p:txBody>
-      </p:sp>
-      <p:sp>
-        <p:nvSpPr>
-          <p:cNvPr id="3" name="Content Placeholder 2">
-            <a:extLst>
-              <a:ext uri="{FF2B5EF4-FFF2-40B4-BE49-F238E27FC236}">
-                <a16:creationId xmlns:a16="http://schemas.microsoft.com/office/drawing/2014/main" id="{95219A84-C074-463F-B464-67F9041828BB}"/>
+            <a:r>
+              <a:rPr lang="en-US" altLang="zh-TW" dirty="0"/>
+              <a:t>API structure</a:t>
+            </a:r>
+            <a:endParaRPr lang="zh-TW" altLang="en-US" dirty="0"/>
+          </a:p>
+        </p:txBody>
+      </p:sp>
+      <p:sp>
+        <p:nvSpPr>
+          <p:cNvPr id="5" name="Content Placeholder 4">
+            <a:extLst>
+              <a:ext uri="{FF2B5EF4-FFF2-40B4-BE49-F238E27FC236}">
+                <a16:creationId xmlns:a16="http://schemas.microsoft.com/office/drawing/2014/main" id="{8EAB92C2-B7FD-4C97-80EC-B8EBC7A487F3}"/>
               </a:ext>
             </a:extLst>
           </p:cNvPr>
@@ -9002,19 +10904,442 @@
             <p:ph idx="1"/>
           </p:nvPr>
         </p:nvSpPr>
-        <p:spPr/>
-        <p:txBody>
-          <a:bodyPr/>
-          <a:lstStyle/>
-          <a:p>
-            <a:endParaRPr lang="zh-TW" altLang="en-US"/>
-          </a:p>
-        </p:txBody>
-      </p:sp>
+        <p:spPr>
+          <a:xfrm>
+            <a:off x="838200" y="1066782"/>
+            <a:ext cx="10515600" cy="1766066"/>
+          </a:xfrm>
+        </p:spPr>
+        <p:txBody>
+          <a:bodyPr>
+            <a:normAutofit/>
+          </a:bodyPr>
+          <a:lstStyle/>
+          <a:p>
+            <a:r>
+              <a:rPr lang="en-US" altLang="zh-TW" dirty="0" err="1"/>
+              <a:t>Add_to_histogram</a:t>
+            </a:r>
+            <a:endParaRPr lang="en-US" altLang="zh-TW" dirty="0"/>
+          </a:p>
+          <a:p>
+            <a:pPr lvl="1"/>
+            <a:r>
+              <a:rPr lang="en-US" altLang="zh-TW" dirty="0"/>
+              <a:t>Input: (u8) </a:t>
+            </a:r>
+            <a:r>
+              <a:rPr lang="en-US" altLang="zh-TW" dirty="0" err="1"/>
+              <a:t>LBP_Value</a:t>
+            </a:r>
+            <a:r>
+              <a:rPr lang="en-US" altLang="zh-TW" dirty="0"/>
+              <a:t>, (u8[256]) </a:t>
+            </a:r>
+            <a:r>
+              <a:rPr lang="en-US" altLang="zh-TW" dirty="0" err="1"/>
+              <a:t>LBP_Hist</a:t>
+            </a:r>
+            <a:endParaRPr lang="en-US" altLang="zh-TW" dirty="0"/>
+          </a:p>
+          <a:p>
+            <a:pPr lvl="1"/>
+            <a:r>
+              <a:rPr lang="en-US" altLang="zh-TW" dirty="0"/>
+              <a:t>Output: None</a:t>
+            </a:r>
+          </a:p>
+          <a:p>
+            <a:pPr lvl="1"/>
+            <a:r>
+              <a:rPr lang="en-US" altLang="zh-TW" dirty="0"/>
+              <a:t>Parameters: None</a:t>
+            </a:r>
+          </a:p>
+        </p:txBody>
+      </p:sp>
+      <p:sp>
+        <p:nvSpPr>
+          <p:cNvPr id="6" name="TextBox 5">
+            <a:extLst>
+              <a:ext uri="{FF2B5EF4-FFF2-40B4-BE49-F238E27FC236}">
+                <a16:creationId xmlns:a16="http://schemas.microsoft.com/office/drawing/2014/main" id="{29F0A3BD-184B-45C7-8DB5-98E6D350FD77}"/>
+              </a:ext>
+            </a:extLst>
+          </p:cNvPr>
+          <p:cNvSpPr txBox="1"/>
+          <p:nvPr/>
+        </p:nvSpPr>
+        <p:spPr>
+          <a:xfrm>
+            <a:off x="1264024" y="2718290"/>
+            <a:ext cx="7727576" cy="646331"/>
+          </a:xfrm>
+          <a:prstGeom prst="rect">
+            <a:avLst/>
+          </a:prstGeom>
+          <a:noFill/>
+        </p:spPr>
+        <p:txBody>
+          <a:bodyPr wrap="square">
+            <a:spAutoFit/>
+          </a:bodyPr>
+          <a:lstStyle/>
+          <a:p>
+            <a:r>
+              <a:rPr lang="en-US" altLang="zh-TW" dirty="0"/>
+              <a:t>Pseudocode:</a:t>
+            </a:r>
+          </a:p>
+          <a:p>
+            <a:endParaRPr lang="en-US" altLang="zh-TW" dirty="0"/>
+          </a:p>
+        </p:txBody>
+      </p:sp>
+      <p:pic>
+        <p:nvPicPr>
+          <p:cNvPr id="4" name="Picture 3">
+            <a:extLst>
+              <a:ext uri="{FF2B5EF4-FFF2-40B4-BE49-F238E27FC236}">
+                <a16:creationId xmlns:a16="http://schemas.microsoft.com/office/drawing/2014/main" id="{89464B99-7A84-4056-B6A9-7F8DCED72193}"/>
+              </a:ext>
+            </a:extLst>
+          </p:cNvPr>
+          <p:cNvPicPr>
+            <a:picLocks noChangeAspect="1"/>
+          </p:cNvPicPr>
+          <p:nvPr/>
+        </p:nvPicPr>
+        <p:blipFill>
+          <a:blip r:embed="rId2"/>
+          <a:stretch>
+            <a:fillRect/>
+          </a:stretch>
+        </p:blipFill>
+        <p:spPr>
+          <a:xfrm>
+            <a:off x="1264024" y="3044625"/>
+            <a:ext cx="6858000" cy="597643"/>
+          </a:xfrm>
+          <a:prstGeom prst="rect">
+            <a:avLst/>
+          </a:prstGeom>
+        </p:spPr>
+      </p:pic>
+      <p:sp>
+        <p:nvSpPr>
+          <p:cNvPr id="7" name="Content Placeholder 4">
+            <a:extLst>
+              <a:ext uri="{FF2B5EF4-FFF2-40B4-BE49-F238E27FC236}">
+                <a16:creationId xmlns:a16="http://schemas.microsoft.com/office/drawing/2014/main" id="{98EFF68E-E3B9-436B-ABCD-A0716BD76E59}"/>
+              </a:ext>
+            </a:extLst>
+          </p:cNvPr>
+          <p:cNvSpPr txBox="1">
+            <a:spLocks/>
+          </p:cNvSpPr>
+          <p:nvPr/>
+        </p:nvSpPr>
+        <p:spPr>
+          <a:xfrm>
+            <a:off x="6096000" y="3642268"/>
+            <a:ext cx="5689720" cy="1992509"/>
+          </a:xfrm>
+          <a:prstGeom prst="rect">
+            <a:avLst/>
+          </a:prstGeom>
+        </p:spPr>
+        <p:txBody>
+          <a:bodyPr vert="horz" lIns="91440" tIns="45720" rIns="91440" bIns="45720" rtlCol="0">
+            <a:normAutofit/>
+          </a:bodyPr>
+          <a:lstStyle>
+            <a:lvl1pPr marL="228600" indent="-228600" algn="l" defTabSz="914400" rtl="0" eaLnBrk="1" latinLnBrk="0" hangingPunct="1">
+              <a:lnSpc>
+                <a:spcPct val="90000"/>
+              </a:lnSpc>
+              <a:spcBef>
+                <a:spcPts val="1000"/>
+              </a:spcBef>
+              <a:buFont typeface="Arial" panose="020B0604020202020204" pitchFamily="34" charset="0"/>
+              <a:buChar char="•"/>
+              <a:defRPr sz="2800" kern="1200">
+                <a:solidFill>
+                  <a:schemeClr val="tx1"/>
+                </a:solidFill>
+                <a:latin typeface="+mn-lt"/>
+                <a:ea typeface="+mn-ea"/>
+                <a:cs typeface="+mn-cs"/>
+              </a:defRPr>
+            </a:lvl1pPr>
+            <a:lvl2pPr marL="685800" indent="-228600" algn="l" defTabSz="914400" rtl="0" eaLnBrk="1" latinLnBrk="0" hangingPunct="1">
+              <a:lnSpc>
+                <a:spcPct val="90000"/>
+              </a:lnSpc>
+              <a:spcBef>
+                <a:spcPts val="500"/>
+              </a:spcBef>
+              <a:buFont typeface="Arial" panose="020B0604020202020204" pitchFamily="34" charset="0"/>
+              <a:buChar char="•"/>
+              <a:defRPr sz="2400" kern="1200">
+                <a:solidFill>
+                  <a:schemeClr val="tx1"/>
+                </a:solidFill>
+                <a:latin typeface="+mn-lt"/>
+                <a:ea typeface="+mn-ea"/>
+                <a:cs typeface="+mn-cs"/>
+              </a:defRPr>
+            </a:lvl2pPr>
+            <a:lvl3pPr marL="1143000" indent="-228600" algn="l" defTabSz="914400" rtl="0" eaLnBrk="1" latinLnBrk="0" hangingPunct="1">
+              <a:lnSpc>
+                <a:spcPct val="90000"/>
+              </a:lnSpc>
+              <a:spcBef>
+                <a:spcPts val="500"/>
+              </a:spcBef>
+              <a:buFont typeface="Arial" panose="020B0604020202020204" pitchFamily="34" charset="0"/>
+              <a:buChar char="•"/>
+              <a:defRPr sz="2000" kern="1200">
+                <a:solidFill>
+                  <a:schemeClr val="tx1"/>
+                </a:solidFill>
+                <a:latin typeface="+mn-lt"/>
+                <a:ea typeface="+mn-ea"/>
+                <a:cs typeface="+mn-cs"/>
+              </a:defRPr>
+            </a:lvl3pPr>
+            <a:lvl4pPr marL="1600200" indent="-228600" algn="l" defTabSz="914400" rtl="0" eaLnBrk="1" latinLnBrk="0" hangingPunct="1">
+              <a:lnSpc>
+                <a:spcPct val="90000"/>
+              </a:lnSpc>
+              <a:spcBef>
+                <a:spcPts val="500"/>
+              </a:spcBef>
+              <a:buFont typeface="Arial" panose="020B0604020202020204" pitchFamily="34" charset="0"/>
+              <a:buChar char="•"/>
+              <a:defRPr sz="1800" kern="1200">
+                <a:solidFill>
+                  <a:schemeClr val="tx1"/>
+                </a:solidFill>
+                <a:latin typeface="+mn-lt"/>
+                <a:ea typeface="+mn-ea"/>
+                <a:cs typeface="+mn-cs"/>
+              </a:defRPr>
+            </a:lvl4pPr>
+            <a:lvl5pPr marL="2057400" indent="-228600" algn="l" defTabSz="914400" rtl="0" eaLnBrk="1" latinLnBrk="0" hangingPunct="1">
+              <a:lnSpc>
+                <a:spcPct val="90000"/>
+              </a:lnSpc>
+              <a:spcBef>
+                <a:spcPts val="500"/>
+              </a:spcBef>
+              <a:buFont typeface="Arial" panose="020B0604020202020204" pitchFamily="34" charset="0"/>
+              <a:buChar char="•"/>
+              <a:defRPr sz="1800" kern="1200">
+                <a:solidFill>
+                  <a:schemeClr val="tx1"/>
+                </a:solidFill>
+                <a:latin typeface="+mn-lt"/>
+                <a:ea typeface="+mn-ea"/>
+                <a:cs typeface="+mn-cs"/>
+              </a:defRPr>
+            </a:lvl5pPr>
+            <a:lvl6pPr marL="2514600" indent="-228600" algn="l" defTabSz="914400" rtl="0" eaLnBrk="1" latinLnBrk="0" hangingPunct="1">
+              <a:lnSpc>
+                <a:spcPct val="90000"/>
+              </a:lnSpc>
+              <a:spcBef>
+                <a:spcPts val="500"/>
+              </a:spcBef>
+              <a:buFont typeface="Arial" panose="020B0604020202020204" pitchFamily="34" charset="0"/>
+              <a:buChar char="•"/>
+              <a:defRPr sz="1800" kern="1200">
+                <a:solidFill>
+                  <a:schemeClr val="tx1"/>
+                </a:solidFill>
+                <a:latin typeface="+mn-lt"/>
+                <a:ea typeface="+mn-ea"/>
+                <a:cs typeface="+mn-cs"/>
+              </a:defRPr>
+            </a:lvl6pPr>
+            <a:lvl7pPr marL="2971800" indent="-228600" algn="l" defTabSz="914400" rtl="0" eaLnBrk="1" latinLnBrk="0" hangingPunct="1">
+              <a:lnSpc>
+                <a:spcPct val="90000"/>
+              </a:lnSpc>
+              <a:spcBef>
+                <a:spcPts val="500"/>
+              </a:spcBef>
+              <a:buFont typeface="Arial" panose="020B0604020202020204" pitchFamily="34" charset="0"/>
+              <a:buChar char="•"/>
+              <a:defRPr sz="1800" kern="1200">
+                <a:solidFill>
+                  <a:schemeClr val="tx1"/>
+                </a:solidFill>
+                <a:latin typeface="+mn-lt"/>
+                <a:ea typeface="+mn-ea"/>
+                <a:cs typeface="+mn-cs"/>
+              </a:defRPr>
+            </a:lvl7pPr>
+            <a:lvl8pPr marL="3429000" indent="-228600" algn="l" defTabSz="914400" rtl="0" eaLnBrk="1" latinLnBrk="0" hangingPunct="1">
+              <a:lnSpc>
+                <a:spcPct val="90000"/>
+              </a:lnSpc>
+              <a:spcBef>
+                <a:spcPts val="500"/>
+              </a:spcBef>
+              <a:buFont typeface="Arial" panose="020B0604020202020204" pitchFamily="34" charset="0"/>
+              <a:buChar char="•"/>
+              <a:defRPr sz="1800" kern="1200">
+                <a:solidFill>
+                  <a:schemeClr val="tx1"/>
+                </a:solidFill>
+                <a:latin typeface="+mn-lt"/>
+                <a:ea typeface="+mn-ea"/>
+                <a:cs typeface="+mn-cs"/>
+              </a:defRPr>
+            </a:lvl8pPr>
+            <a:lvl9pPr marL="3886200" indent="-228600" algn="l" defTabSz="914400" rtl="0" eaLnBrk="1" latinLnBrk="0" hangingPunct="1">
+              <a:lnSpc>
+                <a:spcPct val="90000"/>
+              </a:lnSpc>
+              <a:spcBef>
+                <a:spcPts val="500"/>
+              </a:spcBef>
+              <a:buFont typeface="Arial" panose="020B0604020202020204" pitchFamily="34" charset="0"/>
+              <a:buChar char="•"/>
+              <a:defRPr sz="1800" kern="1200">
+                <a:solidFill>
+                  <a:schemeClr val="tx1"/>
+                </a:solidFill>
+                <a:latin typeface="+mn-lt"/>
+                <a:ea typeface="+mn-ea"/>
+                <a:cs typeface="+mn-cs"/>
+              </a:defRPr>
+            </a:lvl9pPr>
+          </a:lstStyle>
+          <a:p>
+            <a:r>
+              <a:rPr lang="en-US" altLang="zh-TW" dirty="0" err="1"/>
+              <a:t>sort_N_max_hist</a:t>
+            </a:r>
+            <a:endParaRPr lang="en-US" altLang="zh-TW" dirty="0"/>
+          </a:p>
+          <a:p>
+            <a:pPr lvl="1"/>
+            <a:r>
+              <a:rPr lang="en-US" altLang="zh-TW" dirty="0"/>
+              <a:t>Input: (u8[256]) </a:t>
+            </a:r>
+            <a:r>
+              <a:rPr lang="en-US" altLang="zh-TW" dirty="0" err="1"/>
+              <a:t>LBP_Hist</a:t>
+            </a:r>
+            <a:endParaRPr lang="en-US" altLang="zh-TW" dirty="0"/>
+          </a:p>
+          <a:p>
+            <a:pPr lvl="1"/>
+            <a:r>
+              <a:rPr lang="en-US" altLang="zh-TW" dirty="0"/>
+              <a:t>Output: (u8) </a:t>
+            </a:r>
+            <a:r>
+              <a:rPr lang="en-US" altLang="zh-TW" dirty="0" err="1"/>
+              <a:t>LBP_Mode</a:t>
+            </a:r>
+            <a:r>
+              <a:rPr lang="en-US" altLang="zh-TW" dirty="0"/>
+              <a:t>[N,2]</a:t>
+            </a:r>
+          </a:p>
+          <a:p>
+            <a:pPr lvl="1"/>
+            <a:r>
+              <a:rPr lang="en-US" altLang="zh-TW" dirty="0"/>
+              <a:t>Parameters: (u8)</a:t>
+            </a:r>
+            <a:r>
+              <a:rPr lang="zh-TW" altLang="en-US" dirty="0"/>
+              <a:t> </a:t>
+            </a:r>
+            <a:r>
+              <a:rPr lang="en-US" altLang="zh-TW" dirty="0"/>
+              <a:t>N </a:t>
+            </a:r>
+          </a:p>
+        </p:txBody>
+      </p:sp>
+      <p:sp>
+        <p:nvSpPr>
+          <p:cNvPr id="8" name="TextBox 7">
+            <a:extLst>
+              <a:ext uri="{FF2B5EF4-FFF2-40B4-BE49-F238E27FC236}">
+                <a16:creationId xmlns:a16="http://schemas.microsoft.com/office/drawing/2014/main" id="{3D8AEF32-CA2F-4DEC-AC01-FE5B3824FB5D}"/>
+              </a:ext>
+            </a:extLst>
+          </p:cNvPr>
+          <p:cNvSpPr txBox="1"/>
+          <p:nvPr/>
+        </p:nvSpPr>
+        <p:spPr>
+          <a:xfrm>
+            <a:off x="6521824" y="5221788"/>
+            <a:ext cx="5178764" cy="646331"/>
+          </a:xfrm>
+          <a:prstGeom prst="rect">
+            <a:avLst/>
+          </a:prstGeom>
+          <a:noFill/>
+        </p:spPr>
+        <p:txBody>
+          <a:bodyPr wrap="square">
+            <a:spAutoFit/>
+          </a:bodyPr>
+          <a:lstStyle/>
+          <a:p>
+            <a:r>
+              <a:rPr lang="en-US" altLang="zh-TW" dirty="0"/>
+              <a:t>Pseudocode:</a:t>
+            </a:r>
+          </a:p>
+          <a:p>
+            <a:endParaRPr lang="en-US" altLang="zh-TW" dirty="0"/>
+          </a:p>
+        </p:txBody>
+      </p:sp>
+      <p:pic>
+        <p:nvPicPr>
+          <p:cNvPr id="9" name="Picture 8">
+            <a:extLst>
+              <a:ext uri="{FF2B5EF4-FFF2-40B4-BE49-F238E27FC236}">
+                <a16:creationId xmlns:a16="http://schemas.microsoft.com/office/drawing/2014/main" id="{858F5085-969D-40AA-BF7B-B63B57E6EE45}"/>
+              </a:ext>
+            </a:extLst>
+          </p:cNvPr>
+          <p:cNvPicPr>
+            <a:picLocks noChangeAspect="1"/>
+          </p:cNvPicPr>
+          <p:nvPr/>
+        </p:nvPicPr>
+        <p:blipFill>
+          <a:blip r:embed="rId3"/>
+          <a:stretch>
+            <a:fillRect/>
+          </a:stretch>
+        </p:blipFill>
+        <p:spPr>
+          <a:xfrm>
+            <a:off x="6521824" y="5604793"/>
+            <a:ext cx="5263896" cy="1143000"/>
+          </a:xfrm>
+          <a:prstGeom prst="rect">
+            <a:avLst/>
+          </a:prstGeom>
+        </p:spPr>
+      </p:pic>
     </p:spTree>
     <p:extLst>
       <p:ext uri="{BB962C8B-B14F-4D97-AF65-F5344CB8AC3E}">
-        <p14:creationId xmlns:p14="http://schemas.microsoft.com/office/powerpoint/2010/main" val="1216768020"/>
+        <p14:creationId xmlns:p14="http://schemas.microsoft.com/office/powerpoint/2010/main" val="1281354304"/>
       </p:ext>
     </p:extLst>
   </p:cSld>

</xml_diff>